<commit_message>
final1 ppt dsh submit
</commit_message>
<xml_diff>
--- a/Presentation/Auto_sales_DH.pptx
+++ b/Presentation/Auto_sales_DH.pptx
@@ -1125,7 +1125,7 @@
   <dgm:whole/>
   <dgm:extLst>
     <a:ext uri="http://schemas.microsoft.com/office/drawing/2008/diagram">
-      <dsp:dataModelExt xmlns:dsp="http://schemas.microsoft.com/office/drawing/2008/diagram" relId="rId7" minVer="http://schemas.openxmlformats.org/drawingml/2006/diagram"/>
+      <dsp:dataModelExt xmlns:dsp="http://schemas.microsoft.com/office/drawing/2008/diagram" relId="rId6" minVer="http://schemas.openxmlformats.org/drawingml/2006/diagram"/>
     </a:ext>
   </dgm:extLst>
 </dgm:dataModel>
@@ -2779,7 +2779,7 @@
           <a:effectLst/>
           <a:extLst>
             <a:ext uri="{91240B29-F687-4f45-9708-019B960494DF}">
-              <a14:hiddenLine xmlns="" xmlns:a14="http://schemas.microsoft.com/office/drawing/2010/main" w="9525">
+              <a14:hiddenLine xmlns:a14="http://schemas.microsoft.com/office/drawing/2010/main" xmlns="" w="9525">
                 <a:solidFill>
                   <a:srgbClr val="000000"/>
                 </a:solidFill>
@@ -4289,7 +4289,7 @@
           <a:ln/>
           <a:extLst>
             <a:ext uri="{91240B29-F687-4f45-9708-019B960494DF}">
-              <a14:hiddenLine xmlns="" xmlns:a14="http://schemas.microsoft.com/office/drawing/2010/main" w="9525">
+              <a14:hiddenLine xmlns:a14="http://schemas.microsoft.com/office/drawing/2010/main" xmlns="" w="9525">
                 <a:solidFill>
                   <a:srgbClr val="000000"/>
                 </a:solidFill>
@@ -4561,7 +4561,7 @@
           <a:ln/>
           <a:extLst>
             <a:ext uri="{91240B29-F687-4f45-9708-019B960494DF}">
-              <a14:hiddenLine xmlns="" xmlns:a14="http://schemas.microsoft.com/office/drawing/2010/main" w="9525">
+              <a14:hiddenLine xmlns:a14="http://schemas.microsoft.com/office/drawing/2010/main" xmlns="" w="9525">
                 <a:solidFill>
                   <a:srgbClr val="000000"/>
                 </a:solidFill>
@@ -4841,7 +4841,7 @@
           <a:ln/>
           <a:extLst>
             <a:ext uri="{91240B29-F687-4f45-9708-019B960494DF}">
-              <a14:hiddenLine xmlns="" xmlns:a14="http://schemas.microsoft.com/office/drawing/2010/main" w="9525">
+              <a14:hiddenLine xmlns:a14="http://schemas.microsoft.com/office/drawing/2010/main" xmlns="" w="9525">
                 <a:solidFill>
                   <a:srgbClr val="000000"/>
                 </a:solidFill>
@@ -5461,7 +5461,7 @@
           <a:ln/>
           <a:extLst>
             <a:ext uri="{91240B29-F687-4f45-9708-019B960494DF}">
-              <a14:hiddenLine xmlns="" xmlns:a14="http://schemas.microsoft.com/office/drawing/2010/main" w="9525">
+              <a14:hiddenLine xmlns:a14="http://schemas.microsoft.com/office/drawing/2010/main" xmlns="" w="9525">
                 <a:solidFill>
                   <a:srgbClr val="000000"/>
                 </a:solidFill>
@@ -5797,7 +5797,7 @@
           <a:ln/>
           <a:extLst>
             <a:ext uri="{91240B29-F687-4f45-9708-019B960494DF}">
-              <a14:hiddenLine xmlns="" xmlns:a14="http://schemas.microsoft.com/office/drawing/2010/main" w="9525">
+              <a14:hiddenLine xmlns:a14="http://schemas.microsoft.com/office/drawing/2010/main" xmlns="" w="9525">
                 <a:solidFill>
                   <a:srgbClr val="000000"/>
                 </a:solidFill>
@@ -6271,7 +6271,7 @@
           <a:ln/>
           <a:extLst>
             <a:ext uri="{91240B29-F687-4f45-9708-019B960494DF}">
-              <a14:hiddenLine xmlns="" xmlns:a14="http://schemas.microsoft.com/office/drawing/2010/main" w="9525">
+              <a14:hiddenLine xmlns:a14="http://schemas.microsoft.com/office/drawing/2010/main" xmlns="" w="9525">
                 <a:solidFill>
                   <a:srgbClr val="000000"/>
                 </a:solidFill>
@@ -6694,7 +6694,7 @@
           <a:ln/>
           <a:extLst>
             <a:ext uri="{91240B29-F687-4f45-9708-019B960494DF}">
-              <a14:hiddenLine xmlns="" xmlns:a14="http://schemas.microsoft.com/office/drawing/2010/main" w="9525">
+              <a14:hiddenLine xmlns:a14="http://schemas.microsoft.com/office/drawing/2010/main" xmlns="" w="9525">
                 <a:solidFill>
                   <a:srgbClr val="000000"/>
                 </a:solidFill>
@@ -8609,265 +8609,6 @@
       </p:grpSpPr>
       <p:sp>
         <p:nvSpPr>
-          <p:cNvPr id="21" name="Rectangle 15">
-            <a:extLst>
-              <a:ext uri="{FF2B5EF4-FFF2-40B4-BE49-F238E27FC236}">
-                <a16:creationId xmlns:a16="http://schemas.microsoft.com/office/drawing/2014/main" id="{A416E3E5-5186-46A4-AFBD-337387D3163D}"/>
-              </a:ext>
-              <a:ext uri="{C183D7F6-B498-43B3-948B-1728B52AA6E4}">
-                <adec:decorative xmlns:adec="http://schemas.microsoft.com/office/drawing/2017/decorative" val="1"/>
-              </a:ext>
-            </a:extLst>
-          </p:cNvPr>
-          <p:cNvSpPr>
-            <a:spLocks noGrp="1" noRot="1" noChangeAspect="1" noMove="1" noResize="1" noEditPoints="1" noAdjustHandles="1" noChangeArrowheads="1" noChangeShapeType="1" noTextEdit="1"/>
-          </p:cNvSpPr>
-          <p:nvPr>
-            <p:extLst>
-              <p:ext uri="{386F3935-93C4-4BCD-93E2-E3B085C9AB24}">
-                <p16:designElem xmlns:p16="http://schemas.microsoft.com/office/powerpoint/2015/main" val="1"/>
-              </p:ext>
-            </p:extLst>
-          </p:nvPr>
-        </p:nvSpPr>
-        <p:spPr>
-          <a:xfrm>
-            <a:off x="4573" y="0"/>
-            <a:ext cx="12187427" cy="6858000"/>
-          </a:xfrm>
-          <a:prstGeom prst="rect">
-            <a:avLst/>
-          </a:prstGeom>
-          <a:solidFill>
-            <a:schemeClr val="bg1"/>
-          </a:solidFill>
-          <a:ln>
-            <a:noFill/>
-          </a:ln>
-        </p:spPr>
-        <p:style>
-          <a:lnRef idx="2">
-            <a:schemeClr val="accent1">
-              <a:shade val="50000"/>
-            </a:schemeClr>
-          </a:lnRef>
-          <a:fillRef idx="1">
-            <a:schemeClr val="accent1"/>
-          </a:fillRef>
-          <a:effectRef idx="0">
-            <a:schemeClr val="accent1"/>
-          </a:effectRef>
-          <a:fontRef idx="minor">
-            <a:schemeClr val="lt1"/>
-          </a:fontRef>
-        </p:style>
-        <p:txBody>
-          <a:bodyPr rtlCol="0" anchor="ctr"/>
-          <a:lstStyle/>
-          <a:p>
-            <a:pPr algn="ctr"/>
-            <a:endParaRPr lang="en-US"/>
-          </a:p>
-        </p:txBody>
-      </p:sp>
-      <p:sp>
-        <p:nvSpPr>
-          <p:cNvPr id="25" name="Freeform 23">
-            <a:extLst>
-              <a:ext uri="{FF2B5EF4-FFF2-40B4-BE49-F238E27FC236}">
-                <a16:creationId xmlns:a16="http://schemas.microsoft.com/office/drawing/2014/main" id="{7B8FAACC-353E-4F84-BA62-A5514185D9A9}"/>
-              </a:ext>
-              <a:ext uri="{C183D7F6-B498-43B3-948B-1728B52AA6E4}">
-                <adec:decorative xmlns:adec="http://schemas.microsoft.com/office/drawing/2017/decorative" val="1"/>
-              </a:ext>
-            </a:extLst>
-          </p:cNvPr>
-          <p:cNvSpPr>
-            <a:spLocks noGrp="1" noRot="1" noChangeAspect="1" noMove="1" noResize="1" noEditPoints="1" noAdjustHandles="1" noChangeArrowheads="1" noChangeShapeType="1" noTextEdit="1"/>
-          </p:cNvSpPr>
-          <p:nvPr>
-            <p:extLst>
-              <p:ext uri="{386F3935-93C4-4BCD-93E2-E3B085C9AB24}">
-                <p16:designElem xmlns:p16="http://schemas.microsoft.com/office/powerpoint/2015/main" val="1"/>
-              </p:ext>
-            </p:extLst>
-          </p:nvPr>
-        </p:nvSpPr>
-        <p:spPr bwMode="white">
-          <a:xfrm flipH="1">
-            <a:off x="7554995" y="0"/>
-            <a:ext cx="4637005" cy="6858000"/>
-          </a:xfrm>
-          <a:custGeom>
-            <a:avLst/>
-            <a:gdLst>
-              <a:gd name="connsiteX0" fmla="*/ 0 w 4637005"/>
-              <a:gd name="connsiteY0" fmla="*/ 0 h 6858000"/>
-              <a:gd name="connsiteX1" fmla="*/ 4637005 w 4637005"/>
-              <a:gd name="connsiteY1" fmla="*/ 0 h 6858000"/>
-              <a:gd name="connsiteX2" fmla="*/ 4637005 w 4637005"/>
-              <a:gd name="connsiteY2" fmla="*/ 1900238 h 6858000"/>
-              <a:gd name="connsiteX3" fmla="*/ 4266589 w 4637005"/>
-              <a:gd name="connsiteY3" fmla="*/ 2178050 h 6858000"/>
-              <a:gd name="connsiteX4" fmla="*/ 4262355 w 4637005"/>
-              <a:gd name="connsiteY4" fmla="*/ 2184400 h 6858000"/>
-              <a:gd name="connsiteX5" fmla="*/ 4256005 w 4637005"/>
-              <a:gd name="connsiteY5" fmla="*/ 2193925 h 6858000"/>
-              <a:gd name="connsiteX6" fmla="*/ 4249655 w 4637005"/>
-              <a:gd name="connsiteY6" fmla="*/ 2201863 h 6858000"/>
-              <a:gd name="connsiteX7" fmla="*/ 4249655 w 4637005"/>
-              <a:gd name="connsiteY7" fmla="*/ 2211388 h 6858000"/>
-              <a:gd name="connsiteX8" fmla="*/ 4249655 w 4637005"/>
-              <a:gd name="connsiteY8" fmla="*/ 2220913 h 6858000"/>
-              <a:gd name="connsiteX9" fmla="*/ 4256005 w 4637005"/>
-              <a:gd name="connsiteY9" fmla="*/ 2228850 h 6858000"/>
-              <a:gd name="connsiteX10" fmla="*/ 4262355 w 4637005"/>
-              <a:gd name="connsiteY10" fmla="*/ 2238375 h 6858000"/>
-              <a:gd name="connsiteX11" fmla="*/ 4266589 w 4637005"/>
-              <a:gd name="connsiteY11" fmla="*/ 2244725 h 6858000"/>
-              <a:gd name="connsiteX12" fmla="*/ 4637005 w 4637005"/>
-              <a:gd name="connsiteY12" fmla="*/ 2522538 h 6858000"/>
-              <a:gd name="connsiteX13" fmla="*/ 4637005 w 4637005"/>
-              <a:gd name="connsiteY13" fmla="*/ 6858000 h 6858000"/>
-              <a:gd name="connsiteX14" fmla="*/ 0 w 4637005"/>
-              <a:gd name="connsiteY14" fmla="*/ 6858000 h 6858000"/>
-            </a:gdLst>
-            <a:ahLst/>
-            <a:cxnLst>
-              <a:cxn ang="0">
-                <a:pos x="connsiteX0" y="connsiteY0"/>
-              </a:cxn>
-              <a:cxn ang="0">
-                <a:pos x="connsiteX1" y="connsiteY1"/>
-              </a:cxn>
-              <a:cxn ang="0">
-                <a:pos x="connsiteX2" y="connsiteY2"/>
-              </a:cxn>
-              <a:cxn ang="0">
-                <a:pos x="connsiteX3" y="connsiteY3"/>
-              </a:cxn>
-              <a:cxn ang="0">
-                <a:pos x="connsiteX4" y="connsiteY4"/>
-              </a:cxn>
-              <a:cxn ang="0">
-                <a:pos x="connsiteX5" y="connsiteY5"/>
-              </a:cxn>
-              <a:cxn ang="0">
-                <a:pos x="connsiteX6" y="connsiteY6"/>
-              </a:cxn>
-              <a:cxn ang="0">
-                <a:pos x="connsiteX7" y="connsiteY7"/>
-              </a:cxn>
-              <a:cxn ang="0">
-                <a:pos x="connsiteX8" y="connsiteY8"/>
-              </a:cxn>
-              <a:cxn ang="0">
-                <a:pos x="connsiteX9" y="connsiteY9"/>
-              </a:cxn>
-              <a:cxn ang="0">
-                <a:pos x="connsiteX10" y="connsiteY10"/>
-              </a:cxn>
-              <a:cxn ang="0">
-                <a:pos x="connsiteX11" y="connsiteY11"/>
-              </a:cxn>
-              <a:cxn ang="0">
-                <a:pos x="connsiteX12" y="connsiteY12"/>
-              </a:cxn>
-              <a:cxn ang="0">
-                <a:pos x="connsiteX13" y="connsiteY13"/>
-              </a:cxn>
-              <a:cxn ang="0">
-                <a:pos x="connsiteX14" y="connsiteY14"/>
-              </a:cxn>
-            </a:cxnLst>
-            <a:rect l="l" t="t" r="r" b="b"/>
-            <a:pathLst>
-              <a:path w="4637005" h="6858000">
-                <a:moveTo>
-                  <a:pt x="0" y="0"/>
-                </a:moveTo>
-                <a:lnTo>
-                  <a:pt x="4637005" y="0"/>
-                </a:lnTo>
-                <a:lnTo>
-                  <a:pt x="4637005" y="1900238"/>
-                </a:lnTo>
-                <a:lnTo>
-                  <a:pt x="4266589" y="2178050"/>
-                </a:lnTo>
-                <a:lnTo>
-                  <a:pt x="4262355" y="2184400"/>
-                </a:lnTo>
-                <a:lnTo>
-                  <a:pt x="4256005" y="2193925"/>
-                </a:lnTo>
-                <a:lnTo>
-                  <a:pt x="4249655" y="2201863"/>
-                </a:lnTo>
-                <a:lnTo>
-                  <a:pt x="4249655" y="2211388"/>
-                </a:lnTo>
-                <a:lnTo>
-                  <a:pt x="4249655" y="2220913"/>
-                </a:lnTo>
-                <a:lnTo>
-                  <a:pt x="4256005" y="2228850"/>
-                </a:lnTo>
-                <a:lnTo>
-                  <a:pt x="4262355" y="2238375"/>
-                </a:lnTo>
-                <a:lnTo>
-                  <a:pt x="4266589" y="2244725"/>
-                </a:lnTo>
-                <a:lnTo>
-                  <a:pt x="4637005" y="2522538"/>
-                </a:lnTo>
-                <a:lnTo>
-                  <a:pt x="4637005" y="6858000"/>
-                </a:lnTo>
-                <a:lnTo>
-                  <a:pt x="0" y="6858000"/>
-                </a:lnTo>
-                <a:close/>
-              </a:path>
-            </a:pathLst>
-          </a:custGeom>
-          <a:solidFill>
-            <a:srgbClr val="212121"/>
-          </a:solidFill>
-          <a:ln>
-            <a:noFill/>
-            <a:headEnd/>
-            <a:tailEnd/>
-          </a:ln>
-        </p:spPr>
-        <p:style>
-          <a:lnRef idx="1">
-            <a:schemeClr val="accent1"/>
-          </a:lnRef>
-          <a:fillRef idx="3">
-            <a:schemeClr val="accent1"/>
-          </a:fillRef>
-          <a:effectRef idx="2">
-            <a:schemeClr val="accent1"/>
-          </a:effectRef>
-          <a:fontRef idx="minor">
-            <a:schemeClr val="lt1"/>
-          </a:fontRef>
-        </p:style>
-        <p:txBody>
-          <a:bodyPr wrap="square" rtlCol="0" anchor="ctr">
-            <a:noAutofit/>
-          </a:bodyPr>
-          <a:lstStyle/>
-          <a:p>
-            <a:pPr algn="ctr"/>
-            <a:endParaRPr lang="en-US"/>
-          </a:p>
-        </p:txBody>
-      </p:sp>
-      <p:sp>
-        <p:nvSpPr>
           <p:cNvPr id="2" name="Title 1">
             <a:extLst>
               <a:ext uri="{FF2B5EF4-FFF2-40B4-BE49-F238E27FC236}">
@@ -8923,6 +8664,103 @@
                 <a:srgbClr val="FFFFFF"/>
               </a:solidFill>
             </a:endParaRPr>
+          </a:p>
+        </p:txBody>
+      </p:sp>
+      <p:sp>
+        <p:nvSpPr>
+          <p:cNvPr id="9" name="Content Placeholder 2">
+            <a:extLst>
+              <a:ext uri="{FF2B5EF4-FFF2-40B4-BE49-F238E27FC236}">
+                <a16:creationId xmlns:a16="http://schemas.microsoft.com/office/drawing/2014/main" id="{A23D8724-F6E9-4756-B86A-C70C42FDB492}"/>
+              </a:ext>
+            </a:extLst>
+          </p:cNvPr>
+          <p:cNvSpPr>
+            <a:spLocks noGrp="1"/>
+          </p:cNvSpPr>
+          <p:nvPr>
+            <p:ph idx="1"/>
+          </p:nvPr>
+        </p:nvSpPr>
+        <p:spPr>
+          <a:xfrm>
+            <a:off x="8164749" y="1946922"/>
+            <a:ext cx="3939665" cy="4706797"/>
+          </a:xfrm>
+        </p:spPr>
+        <p:txBody>
+          <a:bodyPr>
+            <a:normAutofit/>
+          </a:bodyPr>
+          <a:lstStyle/>
+          <a:p>
+            <a:pPr>
+              <a:lnSpc>
+                <a:spcPct val="90000"/>
+              </a:lnSpc>
+              <a:buFont typeface="Wingdings" panose="05000000000000000000" pitchFamily="2" charset="2"/>
+              <a:buChar char="Ø"/>
+            </a:pPr>
+            <a:r>
+              <a:rPr lang="en-US" sz="2000" dirty="0">
+                <a:solidFill>
+                  <a:srgbClr val="FFFFFF"/>
+                </a:solidFill>
+              </a:rPr>
+              <a:t>New Auto Prices tend to increase every year</a:t>
+            </a:r>
+          </a:p>
+          <a:p>
+            <a:pPr>
+              <a:lnSpc>
+                <a:spcPct val="90000"/>
+              </a:lnSpc>
+              <a:buFont typeface="Wingdings" panose="05000000000000000000" pitchFamily="2" charset="2"/>
+              <a:buChar char="Ø"/>
+            </a:pPr>
+            <a:r>
+              <a:rPr lang="en-US" sz="2000" dirty="0">
+                <a:solidFill>
+                  <a:srgbClr val="FFFFFF"/>
+                </a:solidFill>
+              </a:rPr>
+              <a:t>New &amp; Used Auto Prices tend to increase together</a:t>
+            </a:r>
+          </a:p>
+          <a:p>
+            <a:pPr>
+              <a:lnSpc>
+                <a:spcPct val="90000"/>
+              </a:lnSpc>
+              <a:buFont typeface="Wingdings" panose="05000000000000000000" pitchFamily="2" charset="2"/>
+              <a:buChar char="Ø"/>
+            </a:pPr>
+            <a:r>
+              <a:rPr lang="en-US" sz="2000" dirty="0">
+                <a:solidFill>
+                  <a:srgbClr val="FFFFFF"/>
+                </a:solidFill>
+              </a:rPr>
+              <a:t>Steel Price is positively correlated to Gas Price with a tendency to increase together</a:t>
+            </a:r>
+          </a:p>
+          <a:p>
+            <a:pPr>
+              <a:lnSpc>
+                <a:spcPct val="90000"/>
+              </a:lnSpc>
+              <a:buFont typeface="Wingdings" panose="05000000000000000000" pitchFamily="2" charset="2"/>
+              <a:buChar char="Ø"/>
+            </a:pPr>
+            <a:r>
+              <a:rPr lang="en-US" sz="2000" dirty="0">
+                <a:solidFill>
+                  <a:srgbClr val="FFFFFF"/>
+                </a:solidFill>
+              </a:rPr>
+              <a:t>Steel Price &amp; the price of Used Vehicles also may have a tendency to increase together</a:t>
+            </a:r>
           </a:p>
         </p:txBody>
       </p:sp>
@@ -8964,103 +8802,6 @@
           <a:effectLst/>
         </p:spPr>
       </p:pic>
-      <p:sp>
-        <p:nvSpPr>
-          <p:cNvPr id="9" name="Content Placeholder 2">
-            <a:extLst>
-              <a:ext uri="{FF2B5EF4-FFF2-40B4-BE49-F238E27FC236}">
-                <a16:creationId xmlns:a16="http://schemas.microsoft.com/office/drawing/2014/main" id="{A23D8724-F6E9-4756-B86A-C70C42FDB492}"/>
-              </a:ext>
-            </a:extLst>
-          </p:cNvPr>
-          <p:cNvSpPr>
-            <a:spLocks noGrp="1"/>
-          </p:cNvSpPr>
-          <p:nvPr>
-            <p:ph idx="1"/>
-          </p:nvPr>
-        </p:nvSpPr>
-        <p:spPr>
-          <a:xfrm>
-            <a:off x="8164749" y="1946922"/>
-            <a:ext cx="3939665" cy="4706797"/>
-          </a:xfrm>
-        </p:spPr>
-        <p:txBody>
-          <a:bodyPr>
-            <a:normAutofit/>
-          </a:bodyPr>
-          <a:lstStyle/>
-          <a:p>
-            <a:pPr>
-              <a:lnSpc>
-                <a:spcPct val="90000"/>
-              </a:lnSpc>
-              <a:buFont typeface="Wingdings" panose="05000000000000000000" pitchFamily="2" charset="2"/>
-              <a:buChar char="Ø"/>
-            </a:pPr>
-            <a:r>
-              <a:rPr lang="en-US" sz="2000" dirty="0">
-                <a:solidFill>
-                  <a:srgbClr val="FFFFFF"/>
-                </a:solidFill>
-              </a:rPr>
-              <a:t>New Auto Prices tend to increase every year</a:t>
-            </a:r>
-          </a:p>
-          <a:p>
-            <a:pPr>
-              <a:lnSpc>
-                <a:spcPct val="90000"/>
-              </a:lnSpc>
-              <a:buFont typeface="Wingdings" panose="05000000000000000000" pitchFamily="2" charset="2"/>
-              <a:buChar char="Ø"/>
-            </a:pPr>
-            <a:r>
-              <a:rPr lang="en-US" sz="2000" dirty="0">
-                <a:solidFill>
-                  <a:srgbClr val="FFFFFF"/>
-                </a:solidFill>
-              </a:rPr>
-              <a:t>New &amp; Used Auto Prices tend to increase together</a:t>
-            </a:r>
-          </a:p>
-          <a:p>
-            <a:pPr>
-              <a:lnSpc>
-                <a:spcPct val="90000"/>
-              </a:lnSpc>
-              <a:buFont typeface="Wingdings" panose="05000000000000000000" pitchFamily="2" charset="2"/>
-              <a:buChar char="Ø"/>
-            </a:pPr>
-            <a:r>
-              <a:rPr lang="en-US" sz="2000" dirty="0">
-                <a:solidFill>
-                  <a:srgbClr val="FFFFFF"/>
-                </a:solidFill>
-              </a:rPr>
-              <a:t>Steel Price is positively correlated to Gas Price with a tendency to increase together</a:t>
-            </a:r>
-          </a:p>
-          <a:p>
-            <a:pPr>
-              <a:lnSpc>
-                <a:spcPct val="90000"/>
-              </a:lnSpc>
-              <a:buFont typeface="Wingdings" panose="05000000000000000000" pitchFamily="2" charset="2"/>
-              <a:buChar char="Ø"/>
-            </a:pPr>
-            <a:r>
-              <a:rPr lang="en-US" sz="2000" dirty="0">
-                <a:solidFill>
-                  <a:srgbClr val="FFFFFF"/>
-                </a:solidFill>
-              </a:rPr>
-              <a:t>Steel Price &amp; the price of Used Vehicles also may have a tendency to increase together</a:t>
-            </a:r>
-          </a:p>
-        </p:txBody>
-      </p:sp>
       <p:pic>
         <p:nvPicPr>
           <p:cNvPr id="5" name="Picture 4">
@@ -9131,69 +8872,6 @@
       </p:grpSpPr>
       <p:sp>
         <p:nvSpPr>
-          <p:cNvPr id="30" name="Rectangle 8">
-            <a:extLst>
-              <a:ext uri="{FF2B5EF4-FFF2-40B4-BE49-F238E27FC236}">
-                <a16:creationId xmlns:a16="http://schemas.microsoft.com/office/drawing/2014/main" id="{089A69AF-D57B-49B4-886C-D4A5DC194421}"/>
-              </a:ext>
-              <a:ext uri="{C183D7F6-B498-43B3-948B-1728B52AA6E4}">
-                <adec:decorative xmlns:adec="http://schemas.microsoft.com/office/drawing/2017/decorative" val="1"/>
-              </a:ext>
-            </a:extLst>
-          </p:cNvPr>
-          <p:cNvSpPr>
-            <a:spLocks noGrp="1" noRot="1" noChangeAspect="1" noMove="1" noResize="1" noEditPoints="1" noAdjustHandles="1" noChangeArrowheads="1" noChangeShapeType="1" noTextEdit="1"/>
-          </p:cNvSpPr>
-          <p:nvPr>
-            <p:extLst>
-              <p:ext uri="{386F3935-93C4-4BCD-93E2-E3B085C9AB24}">
-                <p16:designElem xmlns:p16="http://schemas.microsoft.com/office/powerpoint/2015/main" val="1"/>
-              </p:ext>
-            </p:extLst>
-          </p:nvPr>
-        </p:nvSpPr>
-        <p:spPr>
-          <a:xfrm>
-            <a:off x="0" y="0"/>
-            <a:ext cx="12192000" cy="6858000"/>
-          </a:xfrm>
-          <a:prstGeom prst="rect">
-            <a:avLst/>
-          </a:prstGeom>
-          <a:solidFill>
-            <a:schemeClr val="accent1"/>
-          </a:solidFill>
-          <a:ln>
-            <a:noFill/>
-          </a:ln>
-        </p:spPr>
-        <p:style>
-          <a:lnRef idx="2">
-            <a:schemeClr val="accent1">
-              <a:shade val="50000"/>
-            </a:schemeClr>
-          </a:lnRef>
-          <a:fillRef idx="1">
-            <a:schemeClr val="accent1"/>
-          </a:fillRef>
-          <a:effectRef idx="0">
-            <a:schemeClr val="accent1"/>
-          </a:effectRef>
-          <a:fontRef idx="minor">
-            <a:schemeClr val="lt1"/>
-          </a:fontRef>
-        </p:style>
-        <p:txBody>
-          <a:bodyPr rtlCol="0" anchor="ctr"/>
-          <a:lstStyle/>
-          <a:p>
-            <a:pPr algn="ctr"/>
-            <a:endParaRPr lang="en-US"/>
-          </a:p>
-        </p:txBody>
-      </p:sp>
-      <p:sp>
-        <p:nvSpPr>
           <p:cNvPr id="2" name="Title 1">
             <a:extLst>
               <a:ext uri="{FF2B5EF4-FFF2-40B4-BE49-F238E27FC236}">
@@ -9210,7 +8888,7 @@
         </p:nvSpPr>
         <p:spPr>
           <a:xfrm>
-            <a:off x="6819683" y="215153"/>
+            <a:off x="555558" y="577193"/>
             <a:ext cx="4127717" cy="940547"/>
           </a:xfrm>
           <a:effectLst/>
@@ -9229,7 +8907,7 @@
                   </a:schemeClr>
                 </a:solidFill>
               </a:rPr>
-              <a:t>Discussion</a:t>
+              <a:t>Conclusion</a:t>
             </a:r>
             <a:br>
               <a:rPr lang="en-US" dirty="0"/>
@@ -9237,277 +8915,6 @@
             <a:endParaRPr lang="en-US" dirty="0"/>
           </a:p>
         </p:txBody>
-      </p:sp>
-      <p:sp useBgFill="1">
-        <p:nvSpPr>
-          <p:cNvPr id="11" name="Freeform: Shape 10">
-            <a:extLst>
-              <a:ext uri="{FF2B5EF4-FFF2-40B4-BE49-F238E27FC236}">
-                <a16:creationId xmlns:a16="http://schemas.microsoft.com/office/drawing/2014/main" id="{68F2977E-E0AE-4EB4-A059-59E908EB862A}"/>
-              </a:ext>
-              <a:ext uri="{C183D7F6-B498-43B3-948B-1728B52AA6E4}">
-                <adec:decorative xmlns:adec="http://schemas.microsoft.com/office/drawing/2017/decorative" val="1"/>
-              </a:ext>
-            </a:extLst>
-          </p:cNvPr>
-          <p:cNvSpPr>
-            <a:spLocks noGrp="1" noRot="1" noChangeAspect="1" noMove="1" noResize="1" noEditPoints="1" noAdjustHandles="1" noChangeArrowheads="1" noChangeShapeType="1" noTextEdit="1"/>
-          </p:cNvSpPr>
-          <p:nvPr>
-            <p:extLst>
-              <p:ext uri="{386F3935-93C4-4BCD-93E2-E3B085C9AB24}">
-                <p16:designElem xmlns:p16="http://schemas.microsoft.com/office/powerpoint/2015/main" val="1"/>
-              </p:ext>
-            </p:extLst>
-          </p:nvPr>
-        </p:nvSpPr>
-        <p:spPr bwMode="auto">
-          <a:xfrm rot="16200000">
-            <a:off x="666761" y="-666761"/>
-            <a:ext cx="6858002" cy="8191524"/>
-          </a:xfrm>
-          <a:custGeom>
-            <a:avLst/>
-            <a:gdLst>
-              <a:gd name="connsiteX0" fmla="*/ 6858002 w 6858002"/>
-              <a:gd name="connsiteY0" fmla="*/ 6080676 h 8191524"/>
-              <a:gd name="connsiteX1" fmla="*/ 3829244 w 6858002"/>
-              <a:gd name="connsiteY1" fmla="*/ 8068294 h 8191524"/>
-              <a:gd name="connsiteX2" fmla="*/ 3827371 w 6858002"/>
-              <a:gd name="connsiteY2" fmla="*/ 8069839 h 8191524"/>
-              <a:gd name="connsiteX3" fmla="*/ 3824585 w 6858002"/>
-              <a:gd name="connsiteY3" fmla="*/ 8071350 h 8191524"/>
-              <a:gd name="connsiteX4" fmla="*/ 3798695 w 6858002"/>
-              <a:gd name="connsiteY4" fmla="*/ 8088342 h 8191524"/>
-              <a:gd name="connsiteX5" fmla="*/ 3785013 w 6858002"/>
-              <a:gd name="connsiteY5" fmla="*/ 8092830 h 8191524"/>
-              <a:gd name="connsiteX6" fmla="*/ 3706341 w 6858002"/>
-              <a:gd name="connsiteY6" fmla="*/ 8135531 h 8191524"/>
-              <a:gd name="connsiteX7" fmla="*/ 3429000 w 6858002"/>
-              <a:gd name="connsiteY7" fmla="*/ 8191524 h 8191524"/>
-              <a:gd name="connsiteX8" fmla="*/ 3151660 w 6858002"/>
-              <a:gd name="connsiteY8" fmla="*/ 8135531 h 8191524"/>
-              <a:gd name="connsiteX9" fmla="*/ 3072998 w 6858002"/>
-              <a:gd name="connsiteY9" fmla="*/ 8092835 h 8191524"/>
-              <a:gd name="connsiteX10" fmla="*/ 3059300 w 6858002"/>
-              <a:gd name="connsiteY10" fmla="*/ 8088342 h 8191524"/>
-              <a:gd name="connsiteX11" fmla="*/ 3033385 w 6858002"/>
-              <a:gd name="connsiteY11" fmla="*/ 8071334 h 8191524"/>
-              <a:gd name="connsiteX12" fmla="*/ 3030629 w 6858002"/>
-              <a:gd name="connsiteY12" fmla="*/ 8069839 h 8191524"/>
-              <a:gd name="connsiteX13" fmla="*/ 3028777 w 6858002"/>
-              <a:gd name="connsiteY13" fmla="*/ 8068310 h 8191524"/>
-              <a:gd name="connsiteX14" fmla="*/ 2 w 6858002"/>
-              <a:gd name="connsiteY14" fmla="*/ 6080676 h 8191524"/>
-              <a:gd name="connsiteX15" fmla="*/ 6858002 w 6858002"/>
-              <a:gd name="connsiteY15" fmla="*/ 0 h 8191524"/>
-              <a:gd name="connsiteX16" fmla="*/ 6858002 w 6858002"/>
-              <a:gd name="connsiteY16" fmla="*/ 2634972 h 8191524"/>
-              <a:gd name="connsiteX17" fmla="*/ 6858002 w 6858002"/>
-              <a:gd name="connsiteY17" fmla="*/ 2984308 h 8191524"/>
-              <a:gd name="connsiteX18" fmla="*/ 6858002 w 6858002"/>
-              <a:gd name="connsiteY18" fmla="*/ 3291840 h 8191524"/>
-              <a:gd name="connsiteX19" fmla="*/ 6858002 w 6858002"/>
-              <a:gd name="connsiteY19" fmla="*/ 6080675 h 8191524"/>
-              <a:gd name="connsiteX20" fmla="*/ 2 w 6858002"/>
-              <a:gd name="connsiteY20" fmla="*/ 6080675 h 8191524"/>
-              <a:gd name="connsiteX21" fmla="*/ 2 w 6858002"/>
-              <a:gd name="connsiteY21" fmla="*/ 3291840 h 8191524"/>
-              <a:gd name="connsiteX22" fmla="*/ 0 w 6858002"/>
-              <a:gd name="connsiteY22" fmla="*/ 3291840 h 8191524"/>
-              <a:gd name="connsiteX23" fmla="*/ 0 w 6858002"/>
-              <a:gd name="connsiteY23" fmla="*/ 0 h 8191524"/>
-            </a:gdLst>
-            <a:ahLst/>
-            <a:cxnLst>
-              <a:cxn ang="0">
-                <a:pos x="connsiteX0" y="connsiteY0"/>
-              </a:cxn>
-              <a:cxn ang="0">
-                <a:pos x="connsiteX1" y="connsiteY1"/>
-              </a:cxn>
-              <a:cxn ang="0">
-                <a:pos x="connsiteX2" y="connsiteY2"/>
-              </a:cxn>
-              <a:cxn ang="0">
-                <a:pos x="connsiteX3" y="connsiteY3"/>
-              </a:cxn>
-              <a:cxn ang="0">
-                <a:pos x="connsiteX4" y="connsiteY4"/>
-              </a:cxn>
-              <a:cxn ang="0">
-                <a:pos x="connsiteX5" y="connsiteY5"/>
-              </a:cxn>
-              <a:cxn ang="0">
-                <a:pos x="connsiteX6" y="connsiteY6"/>
-              </a:cxn>
-              <a:cxn ang="0">
-                <a:pos x="connsiteX7" y="connsiteY7"/>
-              </a:cxn>
-              <a:cxn ang="0">
-                <a:pos x="connsiteX8" y="connsiteY8"/>
-              </a:cxn>
-              <a:cxn ang="0">
-                <a:pos x="connsiteX9" y="connsiteY9"/>
-              </a:cxn>
-              <a:cxn ang="0">
-                <a:pos x="connsiteX10" y="connsiteY10"/>
-              </a:cxn>
-              <a:cxn ang="0">
-                <a:pos x="connsiteX11" y="connsiteY11"/>
-              </a:cxn>
-              <a:cxn ang="0">
-                <a:pos x="connsiteX12" y="connsiteY12"/>
-              </a:cxn>
-              <a:cxn ang="0">
-                <a:pos x="connsiteX13" y="connsiteY13"/>
-              </a:cxn>
-              <a:cxn ang="0">
-                <a:pos x="connsiteX14" y="connsiteY14"/>
-              </a:cxn>
-              <a:cxn ang="0">
-                <a:pos x="connsiteX15" y="connsiteY15"/>
-              </a:cxn>
-              <a:cxn ang="0">
-                <a:pos x="connsiteX16" y="connsiteY16"/>
-              </a:cxn>
-              <a:cxn ang="0">
-                <a:pos x="connsiteX17" y="connsiteY17"/>
-              </a:cxn>
-              <a:cxn ang="0">
-                <a:pos x="connsiteX18" y="connsiteY18"/>
-              </a:cxn>
-              <a:cxn ang="0">
-                <a:pos x="connsiteX19" y="connsiteY19"/>
-              </a:cxn>
-              <a:cxn ang="0">
-                <a:pos x="connsiteX20" y="connsiteY20"/>
-              </a:cxn>
-              <a:cxn ang="0">
-                <a:pos x="connsiteX21" y="connsiteY21"/>
-              </a:cxn>
-              <a:cxn ang="0">
-                <a:pos x="connsiteX22" y="connsiteY22"/>
-              </a:cxn>
-              <a:cxn ang="0">
-                <a:pos x="connsiteX23" y="connsiteY23"/>
-              </a:cxn>
-            </a:cxnLst>
-            <a:rect l="l" t="t" r="r" b="b"/>
-            <a:pathLst>
-              <a:path w="6858002" h="8191524">
-                <a:moveTo>
-                  <a:pt x="6858002" y="6080676"/>
-                </a:moveTo>
-                <a:lnTo>
-                  <a:pt x="3829244" y="8068294"/>
-                </a:lnTo>
-                <a:lnTo>
-                  <a:pt x="3827371" y="8069839"/>
-                </a:lnTo>
-                <a:lnTo>
-                  <a:pt x="3824585" y="8071350"/>
-                </a:lnTo>
-                <a:lnTo>
-                  <a:pt x="3798695" y="8088342"/>
-                </a:lnTo>
-                <a:lnTo>
-                  <a:pt x="3785013" y="8092830"/>
-                </a:lnTo>
-                <a:lnTo>
-                  <a:pt x="3706341" y="8135531"/>
-                </a:lnTo>
-                <a:cubicBezTo>
-                  <a:pt x="3621098" y="8171586"/>
-                  <a:pt x="3527377" y="8191524"/>
-                  <a:pt x="3429000" y="8191524"/>
-                </a:cubicBezTo>
-                <a:cubicBezTo>
-                  <a:pt x="3330623" y="8191524"/>
-                  <a:pt x="3236903" y="8171586"/>
-                  <a:pt x="3151660" y="8135531"/>
-                </a:cubicBezTo>
-                <a:lnTo>
-                  <a:pt x="3072998" y="8092835"/>
-                </a:lnTo>
-                <a:lnTo>
-                  <a:pt x="3059300" y="8088342"/>
-                </a:lnTo>
-                <a:lnTo>
-                  <a:pt x="3033385" y="8071334"/>
-                </a:lnTo>
-                <a:lnTo>
-                  <a:pt x="3030629" y="8069839"/>
-                </a:lnTo>
-                <a:lnTo>
-                  <a:pt x="3028777" y="8068310"/>
-                </a:lnTo>
-                <a:lnTo>
-                  <a:pt x="2" y="6080676"/>
-                </a:lnTo>
-                <a:close/>
-                <a:moveTo>
-                  <a:pt x="6858002" y="0"/>
-                </a:moveTo>
-                <a:lnTo>
-                  <a:pt x="6858002" y="2634972"/>
-                </a:lnTo>
-                <a:lnTo>
-                  <a:pt x="6858002" y="2984308"/>
-                </a:lnTo>
-                <a:lnTo>
-                  <a:pt x="6858002" y="3291840"/>
-                </a:lnTo>
-                <a:lnTo>
-                  <a:pt x="6858002" y="6080675"/>
-                </a:lnTo>
-                <a:lnTo>
-                  <a:pt x="2" y="6080675"/>
-                </a:lnTo>
-                <a:lnTo>
-                  <a:pt x="2" y="3291840"/>
-                </a:lnTo>
-                <a:lnTo>
-                  <a:pt x="0" y="3291840"/>
-                </a:lnTo>
-                <a:lnTo>
-                  <a:pt x="0" y="0"/>
-                </a:lnTo>
-                <a:close/>
-              </a:path>
-            </a:pathLst>
-          </a:custGeom>
-          <a:ln>
-            <a:noFill/>
-          </a:ln>
-          <a:effectLst/>
-          <a:extLst>
-            <a:ext uri="{91240B29-F687-4f45-9708-019B960494DF}">
-              <a14:hiddenLine xmlns="" xmlns:a14="http://schemas.microsoft.com/office/drawing/2010/main" xmlns:p14="http://schemas.microsoft.com/office/powerpoint/2010/main" xmlns:a16="http://schemas.microsoft.com/office/drawing/2014/main" w="9525">
-                <a:solidFill>
-                  <a:srgbClr val="000000"/>
-                </a:solidFill>
-                <a:round/>
-                <a:headEnd/>
-                <a:tailEnd/>
-              </a14:hiddenLine>
-            </a:ext>
-          </a:extLst>
-        </p:spPr>
-        <p:style>
-          <a:lnRef idx="1">
-            <a:schemeClr val="accent1"/>
-          </a:lnRef>
-          <a:fillRef idx="3">
-            <a:schemeClr val="accent1"/>
-          </a:fillRef>
-          <a:effectRef idx="2">
-            <a:schemeClr val="accent1"/>
-          </a:effectRef>
-          <a:fontRef idx="minor">
-            <a:schemeClr val="lt1"/>
-          </a:fontRef>
-        </p:style>
       </p:sp>
       <p:sp>
         <p:nvSpPr>
@@ -9527,8 +8934,8 @@
         </p:nvSpPr>
         <p:spPr>
           <a:xfrm>
-            <a:off x="451514" y="978993"/>
-            <a:ext cx="4779392" cy="2831007"/>
+            <a:off x="329737" y="2545308"/>
+            <a:ext cx="4779392" cy="2735786"/>
           </a:xfrm>
           <a:effectLst/>
         </p:spPr>
@@ -9619,12 +9026,263 @@
           </a:prstGeom>
         </p:spPr>
       </p:pic>
+      <p:sp>
+        <p:nvSpPr>
+          <p:cNvPr id="10" name="Content Placeholder 2">
+            <a:extLst>
+              <a:ext uri="{FF2B5EF4-FFF2-40B4-BE49-F238E27FC236}">
+                <a16:creationId xmlns:a16="http://schemas.microsoft.com/office/drawing/2014/main" id="{91434053-1AB1-43A1-8F4C-6547A2C45DB1}"/>
+              </a:ext>
+            </a:extLst>
+          </p:cNvPr>
+          <p:cNvSpPr txBox="1">
+            <a:spLocks/>
+          </p:cNvSpPr>
+          <p:nvPr/>
+        </p:nvSpPr>
+        <p:spPr>
+          <a:xfrm>
+            <a:off x="223824" y="5439017"/>
+            <a:ext cx="3395479" cy="889494"/>
+          </a:xfrm>
+          <a:prstGeom prst="rect">
+            <a:avLst/>
+          </a:prstGeom>
+          <a:effectLst>
+            <a:outerShdw blurRad="50800" dir="14400000">
+              <a:srgbClr val="000000">
+                <a:alpha val="40000"/>
+              </a:srgbClr>
+            </a:outerShdw>
+          </a:effectLst>
+        </p:spPr>
+        <p:txBody>
+          <a:bodyPr vert="horz" lIns="91440" tIns="45720" rIns="91440" bIns="45720" rtlCol="0" anchor="ctr">
+            <a:normAutofit fontScale="62500" lnSpcReduction="20000"/>
+          </a:bodyPr>
+          <a:lstStyle>
+            <a:lvl1pPr marL="342900" indent="-342900" algn="l" defTabSz="457200" rtl="0" eaLnBrk="1" latinLnBrk="0" hangingPunct="1">
+              <a:spcBef>
+                <a:spcPct val="20000"/>
+              </a:spcBef>
+              <a:spcAft>
+                <a:spcPts val="600"/>
+              </a:spcAft>
+              <a:buClr>
+                <a:schemeClr val="accent1"/>
+              </a:buClr>
+              <a:buFont typeface="Wingdings 2" charset="2"/>
+              <a:buChar char=""/>
+              <a:defRPr sz="1800" kern="1200">
+                <a:solidFill>
+                  <a:schemeClr val="tx1"/>
+                </a:solidFill>
+                <a:latin typeface="+mn-lt"/>
+                <a:ea typeface="+mn-ea"/>
+                <a:cs typeface="+mn-cs"/>
+              </a:defRPr>
+            </a:lvl1pPr>
+            <a:lvl2pPr marL="742950" indent="-285750" algn="l" defTabSz="457200" rtl="0" eaLnBrk="1" latinLnBrk="0" hangingPunct="1">
+              <a:spcBef>
+                <a:spcPct val="20000"/>
+              </a:spcBef>
+              <a:spcAft>
+                <a:spcPts val="600"/>
+              </a:spcAft>
+              <a:buClr>
+                <a:schemeClr val="accent1"/>
+              </a:buClr>
+              <a:buFont typeface="Wingdings 2" charset="2"/>
+              <a:buChar char=""/>
+              <a:defRPr sz="1600" kern="1200">
+                <a:solidFill>
+                  <a:schemeClr val="tx1"/>
+                </a:solidFill>
+                <a:latin typeface="+mn-lt"/>
+                <a:ea typeface="+mn-ea"/>
+                <a:cs typeface="+mn-cs"/>
+              </a:defRPr>
+            </a:lvl2pPr>
+            <a:lvl3pPr marL="1143000" indent="-228600" algn="l" defTabSz="457200" rtl="0" eaLnBrk="1" latinLnBrk="0" hangingPunct="1">
+              <a:spcBef>
+                <a:spcPct val="20000"/>
+              </a:spcBef>
+              <a:spcAft>
+                <a:spcPts val="600"/>
+              </a:spcAft>
+              <a:buClr>
+                <a:schemeClr val="accent1"/>
+              </a:buClr>
+              <a:buFont typeface="Wingdings 2" charset="2"/>
+              <a:buChar char=""/>
+              <a:defRPr sz="1400" kern="1200">
+                <a:solidFill>
+                  <a:schemeClr val="tx1"/>
+                </a:solidFill>
+                <a:latin typeface="+mn-lt"/>
+                <a:ea typeface="+mn-ea"/>
+                <a:cs typeface="+mn-cs"/>
+              </a:defRPr>
+            </a:lvl3pPr>
+            <a:lvl4pPr marL="1600200" indent="-228600" algn="l" defTabSz="457200" rtl="0" eaLnBrk="1" latinLnBrk="0" hangingPunct="1">
+              <a:spcBef>
+                <a:spcPct val="20000"/>
+              </a:spcBef>
+              <a:spcAft>
+                <a:spcPts val="600"/>
+              </a:spcAft>
+              <a:buClr>
+                <a:schemeClr val="accent1"/>
+              </a:buClr>
+              <a:buFont typeface="Wingdings 2" charset="2"/>
+              <a:buChar char=""/>
+              <a:defRPr sz="1200" kern="1200">
+                <a:solidFill>
+                  <a:schemeClr val="tx1"/>
+                </a:solidFill>
+                <a:latin typeface="+mn-lt"/>
+                <a:ea typeface="+mn-ea"/>
+                <a:cs typeface="+mn-cs"/>
+              </a:defRPr>
+            </a:lvl4pPr>
+            <a:lvl5pPr marL="2057400" indent="-228600" algn="l" defTabSz="457200" rtl="0" eaLnBrk="1" latinLnBrk="0" hangingPunct="1">
+              <a:spcBef>
+                <a:spcPct val="20000"/>
+              </a:spcBef>
+              <a:spcAft>
+                <a:spcPts val="600"/>
+              </a:spcAft>
+              <a:buClr>
+                <a:schemeClr val="accent1"/>
+              </a:buClr>
+              <a:buFont typeface="Wingdings 2" charset="2"/>
+              <a:buChar char=""/>
+              <a:defRPr sz="1200" kern="1200">
+                <a:solidFill>
+                  <a:schemeClr val="tx1"/>
+                </a:solidFill>
+                <a:latin typeface="+mn-lt"/>
+                <a:ea typeface="+mn-ea"/>
+                <a:cs typeface="+mn-cs"/>
+              </a:defRPr>
+            </a:lvl5pPr>
+            <a:lvl6pPr marL="2400000" indent="-228600" algn="l" defTabSz="457200" rtl="0" eaLnBrk="1" latinLnBrk="0" hangingPunct="1">
+              <a:spcBef>
+                <a:spcPct val="20000"/>
+              </a:spcBef>
+              <a:spcAft>
+                <a:spcPts val="600"/>
+              </a:spcAft>
+              <a:buClr>
+                <a:schemeClr val="accent1"/>
+              </a:buClr>
+              <a:buFont typeface="Wingdings 2" charset="2"/>
+              <a:buChar char=""/>
+              <a:defRPr sz="1200" kern="1200">
+                <a:solidFill>
+                  <a:schemeClr val="tx1"/>
+                </a:solidFill>
+                <a:latin typeface="+mn-lt"/>
+                <a:ea typeface="+mn-ea"/>
+                <a:cs typeface="+mn-cs"/>
+              </a:defRPr>
+            </a:lvl6pPr>
+            <a:lvl7pPr marL="2800000" indent="-228600" algn="l" defTabSz="457200" rtl="0" eaLnBrk="1" latinLnBrk="0" hangingPunct="1">
+              <a:spcBef>
+                <a:spcPct val="20000"/>
+              </a:spcBef>
+              <a:spcAft>
+                <a:spcPts val="600"/>
+              </a:spcAft>
+              <a:buClr>
+                <a:schemeClr val="accent1"/>
+              </a:buClr>
+              <a:buFont typeface="Wingdings 2" charset="2"/>
+              <a:buChar char=""/>
+              <a:defRPr sz="1200" kern="1200">
+                <a:solidFill>
+                  <a:schemeClr val="tx1"/>
+                </a:solidFill>
+                <a:latin typeface="+mn-lt"/>
+                <a:ea typeface="+mn-ea"/>
+                <a:cs typeface="+mn-cs"/>
+              </a:defRPr>
+            </a:lvl7pPr>
+            <a:lvl8pPr marL="3200000" indent="-228600" algn="l" defTabSz="457200" rtl="0" eaLnBrk="1" latinLnBrk="0" hangingPunct="1">
+              <a:spcBef>
+                <a:spcPct val="20000"/>
+              </a:spcBef>
+              <a:spcAft>
+                <a:spcPts val="600"/>
+              </a:spcAft>
+              <a:buClr>
+                <a:schemeClr val="accent1"/>
+              </a:buClr>
+              <a:buFont typeface="Wingdings 2" charset="2"/>
+              <a:buChar char=""/>
+              <a:defRPr sz="1200" kern="1200">
+                <a:solidFill>
+                  <a:schemeClr val="tx1"/>
+                </a:solidFill>
+                <a:latin typeface="+mn-lt"/>
+                <a:ea typeface="+mn-ea"/>
+                <a:cs typeface="+mn-cs"/>
+              </a:defRPr>
+            </a:lvl8pPr>
+            <a:lvl9pPr marL="3600000" indent="-228600" algn="l" defTabSz="457200" rtl="0" eaLnBrk="1" latinLnBrk="0" hangingPunct="1">
+              <a:spcBef>
+                <a:spcPct val="20000"/>
+              </a:spcBef>
+              <a:spcAft>
+                <a:spcPts val="600"/>
+              </a:spcAft>
+              <a:buClr>
+                <a:schemeClr val="accent1"/>
+              </a:buClr>
+              <a:buFont typeface="Wingdings 2" charset="2"/>
+              <a:buChar char=""/>
+              <a:defRPr sz="1200" kern="1200">
+                <a:solidFill>
+                  <a:schemeClr val="tx1"/>
+                </a:solidFill>
+                <a:latin typeface="+mn-lt"/>
+                <a:ea typeface="+mn-ea"/>
+                <a:cs typeface="+mn-cs"/>
+              </a:defRPr>
+            </a:lvl9pPr>
+          </a:lstStyle>
+          <a:p>
+            <a:pPr marL="0" indent="0">
+              <a:buNone/>
+            </a:pPr>
+            <a:r>
+              <a:rPr lang="en-US" b="1" dirty="0"/>
+              <a:t>   </a:t>
+            </a:r>
+            <a:r>
+              <a:rPr lang="en-US" sz="2400" b="1" u="sng" dirty="0"/>
+              <a:t> </a:t>
+            </a:r>
+            <a:r>
+              <a:rPr lang="en-US" sz="4600" u="sng" dirty="0"/>
+              <a:t>New Questions ? </a:t>
+            </a:r>
+          </a:p>
+          <a:p>
+            <a:pPr marL="0" indent="0">
+              <a:buFont typeface="Wingdings 2" charset="2"/>
+              <a:buNone/>
+            </a:pPr>
+            <a:endParaRPr lang="en-US" dirty="0"/>
+          </a:p>
+        </p:txBody>
+      </p:sp>
       <p:pic>
         <p:nvPicPr>
-          <p:cNvPr id="15" name="Picture 14" descr="A picture containing table, person, indoor, wall&#10;&#10;Description automatically generated">
+          <p:cNvPr id="16" name="Picture 15" descr="Diagram, schematic&#10;&#10;Description automatically generated">
             <a:extLst>
               <a:ext uri="{FF2B5EF4-FFF2-40B4-BE49-F238E27FC236}">
-                <a16:creationId xmlns:a16="http://schemas.microsoft.com/office/drawing/2014/main" id="{18103258-F557-4A71-9FF7-FADAE235BA14}"/>
+                <a16:creationId xmlns:a16="http://schemas.microsoft.com/office/drawing/2014/main" id="{FB44A68F-10B2-41EF-B281-A942DB414923}"/>
               </a:ext>
             </a:extLst>
           </p:cNvPr>
@@ -9641,38 +9299,8 @@
         </p:blipFill>
         <p:spPr>
           <a:xfrm>
-            <a:off x="8018407" y="4203700"/>
-            <a:ext cx="4078123" cy="2439147"/>
-          </a:xfrm>
-          <a:prstGeom prst="rect">
-            <a:avLst/>
-          </a:prstGeom>
-        </p:spPr>
-      </p:pic>
-      <p:pic>
-        <p:nvPicPr>
-          <p:cNvPr id="20" name="Picture 19" descr="Graphical user interface, website&#10;&#10;Description automatically generated">
-            <a:extLst>
-              <a:ext uri="{FF2B5EF4-FFF2-40B4-BE49-F238E27FC236}">
-                <a16:creationId xmlns:a16="http://schemas.microsoft.com/office/drawing/2014/main" id="{8F225668-7FE5-4BE4-8948-3D8E59E32C7E}"/>
-              </a:ext>
-            </a:extLst>
-          </p:cNvPr>
-          <p:cNvPicPr>
-            <a:picLocks noChangeAspect="1"/>
-          </p:cNvPicPr>
-          <p:nvPr/>
-        </p:nvPicPr>
-        <p:blipFill>
-          <a:blip r:embed="rId4"/>
-          <a:stretch>
-            <a:fillRect/>
-          </a:stretch>
-        </p:blipFill>
-        <p:spPr>
-          <a:xfrm>
-            <a:off x="451514" y="3628205"/>
-            <a:ext cx="5365086" cy="2831006"/>
+            <a:off x="4882931" y="2383612"/>
+            <a:ext cx="6705600" cy="3994595"/>
           </a:xfrm>
           <a:prstGeom prst="rect">
             <a:avLst/>
@@ -9681,73 +9309,252 @@
       </p:pic>
       <p:sp>
         <p:nvSpPr>
-          <p:cNvPr id="32" name="TextBox 31">
+          <p:cNvPr id="19" name="Content Placeholder 2">
             <a:extLst>
               <a:ext uri="{FF2B5EF4-FFF2-40B4-BE49-F238E27FC236}">
-                <a16:creationId xmlns:a16="http://schemas.microsoft.com/office/drawing/2014/main" id="{3642C03D-8422-4A18-ACED-268589F1407E}"/>
+                <a16:creationId xmlns:a16="http://schemas.microsoft.com/office/drawing/2014/main" id="{67F4CCBB-DBF0-445C-BF4C-0076ECA2A1A7}"/>
               </a:ext>
             </a:extLst>
           </p:cNvPr>
-          <p:cNvSpPr txBox="1"/>
+          <p:cNvSpPr txBox="1">
+            <a:spLocks/>
+          </p:cNvSpPr>
           <p:nvPr/>
         </p:nvSpPr>
         <p:spPr>
           <a:xfrm>
-            <a:off x="8124424" y="2024825"/>
-            <a:ext cx="3972107" cy="1692771"/>
+            <a:off x="210572" y="4700923"/>
+            <a:ext cx="3395479" cy="889494"/>
           </a:xfrm>
           <a:prstGeom prst="rect">
             <a:avLst/>
           </a:prstGeom>
-          <a:noFill/>
+          <a:effectLst>
+            <a:outerShdw blurRad="50800" dir="14400000">
+              <a:srgbClr val="000000">
+                <a:alpha val="40000"/>
+              </a:srgbClr>
+            </a:outerShdw>
+          </a:effectLst>
         </p:spPr>
         <p:txBody>
-          <a:bodyPr wrap="square">
-            <a:spAutoFit/>
+          <a:bodyPr vert="horz" lIns="91440" tIns="45720" rIns="91440" bIns="45720" rtlCol="0" anchor="ctr">
+            <a:normAutofit/>
           </a:bodyPr>
-          <a:lstStyle/>
-          <a:p>
-            <a:pPr lvl="1"/>
+          <a:lstStyle>
+            <a:lvl1pPr marL="342900" indent="-342900" algn="l" defTabSz="457200" rtl="0" eaLnBrk="1" latinLnBrk="0" hangingPunct="1">
+              <a:spcBef>
+                <a:spcPct val="20000"/>
+              </a:spcBef>
+              <a:spcAft>
+                <a:spcPts val="600"/>
+              </a:spcAft>
+              <a:buClr>
+                <a:schemeClr val="accent1"/>
+              </a:buClr>
+              <a:buFont typeface="Wingdings 2" charset="2"/>
+              <a:buChar char=""/>
+              <a:defRPr sz="1800" kern="1200">
+                <a:solidFill>
+                  <a:schemeClr val="tx1"/>
+                </a:solidFill>
+                <a:latin typeface="+mn-lt"/>
+                <a:ea typeface="+mn-ea"/>
+                <a:cs typeface="+mn-cs"/>
+              </a:defRPr>
+            </a:lvl1pPr>
+            <a:lvl2pPr marL="742950" indent="-285750" algn="l" defTabSz="457200" rtl="0" eaLnBrk="1" latinLnBrk="0" hangingPunct="1">
+              <a:spcBef>
+                <a:spcPct val="20000"/>
+              </a:spcBef>
+              <a:spcAft>
+                <a:spcPts val="600"/>
+              </a:spcAft>
+              <a:buClr>
+                <a:schemeClr val="accent1"/>
+              </a:buClr>
+              <a:buFont typeface="Wingdings 2" charset="2"/>
+              <a:buChar char=""/>
+              <a:defRPr sz="1600" kern="1200">
+                <a:solidFill>
+                  <a:schemeClr val="tx1"/>
+                </a:solidFill>
+                <a:latin typeface="+mn-lt"/>
+                <a:ea typeface="+mn-ea"/>
+                <a:cs typeface="+mn-cs"/>
+              </a:defRPr>
+            </a:lvl2pPr>
+            <a:lvl3pPr marL="1143000" indent="-228600" algn="l" defTabSz="457200" rtl="0" eaLnBrk="1" latinLnBrk="0" hangingPunct="1">
+              <a:spcBef>
+                <a:spcPct val="20000"/>
+              </a:spcBef>
+              <a:spcAft>
+                <a:spcPts val="600"/>
+              </a:spcAft>
+              <a:buClr>
+                <a:schemeClr val="accent1"/>
+              </a:buClr>
+              <a:buFont typeface="Wingdings 2" charset="2"/>
+              <a:buChar char=""/>
+              <a:defRPr sz="1400" kern="1200">
+                <a:solidFill>
+                  <a:schemeClr val="tx1"/>
+                </a:solidFill>
+                <a:latin typeface="+mn-lt"/>
+                <a:ea typeface="+mn-ea"/>
+                <a:cs typeface="+mn-cs"/>
+              </a:defRPr>
+            </a:lvl3pPr>
+            <a:lvl4pPr marL="1600200" indent="-228600" algn="l" defTabSz="457200" rtl="0" eaLnBrk="1" latinLnBrk="0" hangingPunct="1">
+              <a:spcBef>
+                <a:spcPct val="20000"/>
+              </a:spcBef>
+              <a:spcAft>
+                <a:spcPts val="600"/>
+              </a:spcAft>
+              <a:buClr>
+                <a:schemeClr val="accent1"/>
+              </a:buClr>
+              <a:buFont typeface="Wingdings 2" charset="2"/>
+              <a:buChar char=""/>
+              <a:defRPr sz="1200" kern="1200">
+                <a:solidFill>
+                  <a:schemeClr val="tx1"/>
+                </a:solidFill>
+                <a:latin typeface="+mn-lt"/>
+                <a:ea typeface="+mn-ea"/>
+                <a:cs typeface="+mn-cs"/>
+              </a:defRPr>
+            </a:lvl4pPr>
+            <a:lvl5pPr marL="2057400" indent="-228600" algn="l" defTabSz="457200" rtl="0" eaLnBrk="1" latinLnBrk="0" hangingPunct="1">
+              <a:spcBef>
+                <a:spcPct val="20000"/>
+              </a:spcBef>
+              <a:spcAft>
+                <a:spcPts val="600"/>
+              </a:spcAft>
+              <a:buClr>
+                <a:schemeClr val="accent1"/>
+              </a:buClr>
+              <a:buFont typeface="Wingdings 2" charset="2"/>
+              <a:buChar char=""/>
+              <a:defRPr sz="1200" kern="1200">
+                <a:solidFill>
+                  <a:schemeClr val="tx1"/>
+                </a:solidFill>
+                <a:latin typeface="+mn-lt"/>
+                <a:ea typeface="+mn-ea"/>
+                <a:cs typeface="+mn-cs"/>
+              </a:defRPr>
+            </a:lvl5pPr>
+            <a:lvl6pPr marL="2400000" indent="-228600" algn="l" defTabSz="457200" rtl="0" eaLnBrk="1" latinLnBrk="0" hangingPunct="1">
+              <a:spcBef>
+                <a:spcPct val="20000"/>
+              </a:spcBef>
+              <a:spcAft>
+                <a:spcPts val="600"/>
+              </a:spcAft>
+              <a:buClr>
+                <a:schemeClr val="accent1"/>
+              </a:buClr>
+              <a:buFont typeface="Wingdings 2" charset="2"/>
+              <a:buChar char=""/>
+              <a:defRPr sz="1200" kern="1200">
+                <a:solidFill>
+                  <a:schemeClr val="tx1"/>
+                </a:solidFill>
+                <a:latin typeface="+mn-lt"/>
+                <a:ea typeface="+mn-ea"/>
+                <a:cs typeface="+mn-cs"/>
+              </a:defRPr>
+            </a:lvl6pPr>
+            <a:lvl7pPr marL="2800000" indent="-228600" algn="l" defTabSz="457200" rtl="0" eaLnBrk="1" latinLnBrk="0" hangingPunct="1">
+              <a:spcBef>
+                <a:spcPct val="20000"/>
+              </a:spcBef>
+              <a:spcAft>
+                <a:spcPts val="600"/>
+              </a:spcAft>
+              <a:buClr>
+                <a:schemeClr val="accent1"/>
+              </a:buClr>
+              <a:buFont typeface="Wingdings 2" charset="2"/>
+              <a:buChar char=""/>
+              <a:defRPr sz="1200" kern="1200">
+                <a:solidFill>
+                  <a:schemeClr val="tx1"/>
+                </a:solidFill>
+                <a:latin typeface="+mn-lt"/>
+                <a:ea typeface="+mn-ea"/>
+                <a:cs typeface="+mn-cs"/>
+              </a:defRPr>
+            </a:lvl7pPr>
+            <a:lvl8pPr marL="3200000" indent="-228600" algn="l" defTabSz="457200" rtl="0" eaLnBrk="1" latinLnBrk="0" hangingPunct="1">
+              <a:spcBef>
+                <a:spcPct val="20000"/>
+              </a:spcBef>
+              <a:spcAft>
+                <a:spcPts val="600"/>
+              </a:spcAft>
+              <a:buClr>
+                <a:schemeClr val="accent1"/>
+              </a:buClr>
+              <a:buFont typeface="Wingdings 2" charset="2"/>
+              <a:buChar char=""/>
+              <a:defRPr sz="1200" kern="1200">
+                <a:solidFill>
+                  <a:schemeClr val="tx1"/>
+                </a:solidFill>
+                <a:latin typeface="+mn-lt"/>
+                <a:ea typeface="+mn-ea"/>
+                <a:cs typeface="+mn-cs"/>
+              </a:defRPr>
+            </a:lvl8pPr>
+            <a:lvl9pPr marL="3600000" indent="-228600" algn="l" defTabSz="457200" rtl="0" eaLnBrk="1" latinLnBrk="0" hangingPunct="1">
+              <a:spcBef>
+                <a:spcPct val="20000"/>
+              </a:spcBef>
+              <a:spcAft>
+                <a:spcPts val="600"/>
+              </a:spcAft>
+              <a:buClr>
+                <a:schemeClr val="accent1"/>
+              </a:buClr>
+              <a:buFont typeface="Wingdings 2" charset="2"/>
+              <a:buChar char=""/>
+              <a:defRPr sz="1200" kern="1200">
+                <a:solidFill>
+                  <a:schemeClr val="tx1"/>
+                </a:solidFill>
+                <a:latin typeface="+mn-lt"/>
+                <a:ea typeface="+mn-ea"/>
+                <a:cs typeface="+mn-cs"/>
+              </a:defRPr>
+            </a:lvl9pPr>
+          </a:lstStyle>
+          <a:p>
+            <a:pPr marL="0" indent="0">
+              <a:buNone/>
+            </a:pPr>
+            <a:r>
+              <a:rPr lang="en-US" b="1" dirty="0"/>
+              <a:t>   </a:t>
+            </a:r>
+            <a:r>
+              <a:rPr lang="en-US" sz="2400" b="1" u="sng" dirty="0"/>
+              <a:t> </a:t>
+            </a:r>
             <a:r>
               <a:rPr lang="en-US" sz="3200" u="sng" dirty="0"/>
-              <a:t>Difficulties</a:t>
-            </a:r>
-          </a:p>
-          <a:p>
-            <a:pPr marL="742950" lvl="1" indent="-285750">
-              <a:buFont typeface="Arial" panose="020B0604020202020204" pitchFamily="34" charset="0"/>
-              <a:buChar char="•"/>
+              <a:t>Inferences ? </a:t>
+            </a:r>
+          </a:p>
+          <a:p>
+            <a:pPr marL="0" indent="0">
+              <a:buFont typeface="Wingdings 2" charset="2"/>
+              <a:buNone/>
             </a:pPr>
-            <a:r>
-              <a:rPr lang="en-US" dirty="0"/>
-              <a:t>Obtaining Data</a:t>
-            </a:r>
-          </a:p>
-          <a:p>
-            <a:pPr marL="742950" lvl="1" indent="-285750">
-              <a:buFont typeface="Arial" panose="020B0604020202020204" pitchFamily="34" charset="0"/>
-              <a:buChar char="•"/>
-            </a:pPr>
-            <a:r>
-              <a:rPr lang="en-US" dirty="0"/>
-              <a:t> Cleaning/Formatting Data</a:t>
-            </a:r>
-          </a:p>
-          <a:p>
-            <a:pPr marL="742950" lvl="1" indent="-285750">
-              <a:buFont typeface="Arial" panose="020B0604020202020204" pitchFamily="34" charset="0"/>
-              <a:buChar char="•"/>
-            </a:pPr>
-            <a:r>
-              <a:rPr lang="en-US" dirty="0"/>
-              <a:t> GitHub</a:t>
-            </a:r>
-          </a:p>
-          <a:p>
-            <a:r>
-              <a:rPr lang="en-US" dirty="0"/>
-              <a:t> </a:t>
-            </a:r>
+            <a:endParaRPr lang="en-US" dirty="0"/>
           </a:p>
         </p:txBody>
       </p:sp>
@@ -9800,7 +9607,7 @@
         <p:spPr>
           <a:xfrm>
             <a:off x="654358" y="214009"/>
-            <a:ext cx="10571998" cy="2340608"/>
+            <a:ext cx="10571998" cy="2008278"/>
           </a:xfrm>
         </p:spPr>
         <p:txBody>
@@ -9808,64 +9615,13 @@
           <a:lstStyle/>
           <a:p>
             <a:r>
-              <a:rPr lang="en-US" sz="6600" dirty="0"/>
-              <a:t>Conclusion</a:t>
+              <a:rPr lang="en-US" sz="5400" dirty="0"/>
+              <a:t>Discussion</a:t>
             </a:r>
             <a:br>
               <a:rPr lang="en-US" sz="6600" dirty="0"/>
             </a:br>
             <a:endParaRPr lang="en-US" sz="6600" dirty="0"/>
-          </a:p>
-        </p:txBody>
-      </p:sp>
-      <p:sp>
-        <p:nvSpPr>
-          <p:cNvPr id="3" name="Content Placeholder 2">
-            <a:extLst>
-              <a:ext uri="{FF2B5EF4-FFF2-40B4-BE49-F238E27FC236}">
-                <a16:creationId xmlns:a16="http://schemas.microsoft.com/office/drawing/2014/main" id="{2833F7BB-1371-0E44-9545-E96720C8AD24}"/>
-              </a:ext>
-            </a:extLst>
-          </p:cNvPr>
-          <p:cNvSpPr>
-            <a:spLocks noGrp="1"/>
-          </p:cNvSpPr>
-          <p:nvPr>
-            <p:ph idx="1"/>
-          </p:nvPr>
-        </p:nvSpPr>
-        <p:spPr>
-          <a:xfrm>
-            <a:off x="255399" y="3722262"/>
-            <a:ext cx="3395479" cy="889494"/>
-          </a:xfrm>
-        </p:spPr>
-        <p:txBody>
-          <a:bodyPr>
-            <a:normAutofit fontScale="92500" lnSpcReduction="10000"/>
-          </a:bodyPr>
-          <a:lstStyle/>
-          <a:p>
-            <a:pPr marL="0" indent="0">
-              <a:buNone/>
-            </a:pPr>
-            <a:endParaRPr lang="en-US" b="1" dirty="0"/>
-          </a:p>
-          <a:p>
-            <a:r>
-              <a:rPr lang="en-US" sz="2400" b="1" dirty="0"/>
-              <a:t>  </a:t>
-            </a:r>
-            <a:r>
-              <a:rPr lang="en-US" sz="2600" dirty="0"/>
-              <a:t>New Questions ? </a:t>
-            </a:r>
-          </a:p>
-          <a:p>
-            <a:pPr marL="0" indent="0">
-              <a:buNone/>
-            </a:pPr>
-            <a:endParaRPr lang="en-US" dirty="0"/>
           </a:p>
         </p:txBody>
       </p:sp>
@@ -9939,10 +9695,10 @@
       </p:pic>
       <p:pic>
         <p:nvPicPr>
-          <p:cNvPr id="10" name="Picture 9" descr="Chart, scatter chart&#10;&#10;Description automatically generated">
+          <p:cNvPr id="11" name="Picture 10" descr="A picture containing table, person, indoor, wall&#10;&#10;Description automatically generated">
             <a:extLst>
               <a:ext uri="{FF2B5EF4-FFF2-40B4-BE49-F238E27FC236}">
-                <a16:creationId xmlns:a16="http://schemas.microsoft.com/office/drawing/2014/main" id="{7025A830-D55B-4C12-8A69-B42E19296556}"/>
+                <a16:creationId xmlns:a16="http://schemas.microsoft.com/office/drawing/2014/main" id="{F5DA3E8B-D142-4D5A-953E-84AF00AF9B9C}"/>
               </a:ext>
             </a:extLst>
           </p:cNvPr>
@@ -9959,8 +9715,8 @@
         </p:blipFill>
         <p:spPr>
           <a:xfrm>
-            <a:off x="4574756" y="1999717"/>
-            <a:ext cx="3349459" cy="2194581"/>
+            <a:off x="5334415" y="2386081"/>
+            <a:ext cx="6497071" cy="3904162"/>
           </a:xfrm>
           <a:prstGeom prst="rect">
             <a:avLst/>
@@ -9969,146 +9725,281 @@
       </p:pic>
       <p:sp>
         <p:nvSpPr>
-          <p:cNvPr id="12" name="TextBox 11">
+          <p:cNvPr id="15" name="Content Placeholder 2">
             <a:extLst>
               <a:ext uri="{FF2B5EF4-FFF2-40B4-BE49-F238E27FC236}">
-                <a16:creationId xmlns:a16="http://schemas.microsoft.com/office/drawing/2014/main" id="{C4E9729F-A1F0-42B6-AC4A-5CCE36E982D2}"/>
+                <a16:creationId xmlns:a16="http://schemas.microsoft.com/office/drawing/2014/main" id="{FBAC34F7-5B14-4A67-8201-B98B72DCF0E2}"/>
               </a:ext>
             </a:extLst>
           </p:cNvPr>
-          <p:cNvSpPr txBox="1"/>
+          <p:cNvSpPr txBox="1">
+            <a:spLocks/>
+          </p:cNvSpPr>
           <p:nvPr/>
         </p:nvSpPr>
         <p:spPr>
           <a:xfrm>
-            <a:off x="4303161" y="4221441"/>
-            <a:ext cx="7933956" cy="646331"/>
+            <a:off x="555023" y="3155799"/>
+            <a:ext cx="4779392" cy="2735786"/>
           </a:xfrm>
           <a:prstGeom prst="rect">
             <a:avLst/>
           </a:prstGeom>
-          <a:noFill/>
+          <a:effectLst/>
         </p:spPr>
         <p:txBody>
-          <a:bodyPr wrap="square">
-            <a:spAutoFit/>
+          <a:bodyPr vert="horz" lIns="91440" tIns="45720" rIns="91440" bIns="45720" rtlCol="0" anchor="ctr">
+            <a:normAutofit/>
           </a:bodyPr>
-          <a:lstStyle/>
-          <a:p>
+          <a:lstStyle>
+            <a:lvl1pPr marL="342900" indent="-342900" algn="l" defTabSz="457200" rtl="0" eaLnBrk="1" latinLnBrk="0" hangingPunct="1">
+              <a:spcBef>
+                <a:spcPct val="20000"/>
+              </a:spcBef>
+              <a:spcAft>
+                <a:spcPts val="600"/>
+              </a:spcAft>
+              <a:buClr>
+                <a:schemeClr val="accent1"/>
+              </a:buClr>
+              <a:buFont typeface="Wingdings 2" charset="2"/>
+              <a:buChar char=""/>
+              <a:defRPr sz="1800" kern="1200">
+                <a:solidFill>
+                  <a:schemeClr val="tx1"/>
+                </a:solidFill>
+                <a:latin typeface="+mn-lt"/>
+                <a:ea typeface="+mn-ea"/>
+                <a:cs typeface="+mn-cs"/>
+              </a:defRPr>
+            </a:lvl1pPr>
+            <a:lvl2pPr marL="742950" indent="-285750" algn="l" defTabSz="457200" rtl="0" eaLnBrk="1" latinLnBrk="0" hangingPunct="1">
+              <a:spcBef>
+                <a:spcPct val="20000"/>
+              </a:spcBef>
+              <a:spcAft>
+                <a:spcPts val="600"/>
+              </a:spcAft>
+              <a:buClr>
+                <a:schemeClr val="accent1"/>
+              </a:buClr>
+              <a:buFont typeface="Wingdings 2" charset="2"/>
+              <a:buChar char=""/>
+              <a:defRPr sz="1600" kern="1200">
+                <a:solidFill>
+                  <a:schemeClr val="tx1"/>
+                </a:solidFill>
+                <a:latin typeface="+mn-lt"/>
+                <a:ea typeface="+mn-ea"/>
+                <a:cs typeface="+mn-cs"/>
+              </a:defRPr>
+            </a:lvl2pPr>
+            <a:lvl3pPr marL="1143000" indent="-228600" algn="l" defTabSz="457200" rtl="0" eaLnBrk="1" latinLnBrk="0" hangingPunct="1">
+              <a:spcBef>
+                <a:spcPct val="20000"/>
+              </a:spcBef>
+              <a:spcAft>
+                <a:spcPts val="600"/>
+              </a:spcAft>
+              <a:buClr>
+                <a:schemeClr val="accent1"/>
+              </a:buClr>
+              <a:buFont typeface="Wingdings 2" charset="2"/>
+              <a:buChar char=""/>
+              <a:defRPr sz="1400" kern="1200">
+                <a:solidFill>
+                  <a:schemeClr val="tx1"/>
+                </a:solidFill>
+                <a:latin typeface="+mn-lt"/>
+                <a:ea typeface="+mn-ea"/>
+                <a:cs typeface="+mn-cs"/>
+              </a:defRPr>
+            </a:lvl3pPr>
+            <a:lvl4pPr marL="1600200" indent="-228600" algn="l" defTabSz="457200" rtl="0" eaLnBrk="1" latinLnBrk="0" hangingPunct="1">
+              <a:spcBef>
+                <a:spcPct val="20000"/>
+              </a:spcBef>
+              <a:spcAft>
+                <a:spcPts val="600"/>
+              </a:spcAft>
+              <a:buClr>
+                <a:schemeClr val="accent1"/>
+              </a:buClr>
+              <a:buFont typeface="Wingdings 2" charset="2"/>
+              <a:buChar char=""/>
+              <a:defRPr sz="1200" kern="1200">
+                <a:solidFill>
+                  <a:schemeClr val="tx1"/>
+                </a:solidFill>
+                <a:latin typeface="+mn-lt"/>
+                <a:ea typeface="+mn-ea"/>
+                <a:cs typeface="+mn-cs"/>
+              </a:defRPr>
+            </a:lvl4pPr>
+            <a:lvl5pPr marL="2057400" indent="-228600" algn="l" defTabSz="457200" rtl="0" eaLnBrk="1" latinLnBrk="0" hangingPunct="1">
+              <a:spcBef>
+                <a:spcPct val="20000"/>
+              </a:spcBef>
+              <a:spcAft>
+                <a:spcPts val="600"/>
+              </a:spcAft>
+              <a:buClr>
+                <a:schemeClr val="accent1"/>
+              </a:buClr>
+              <a:buFont typeface="Wingdings 2" charset="2"/>
+              <a:buChar char=""/>
+              <a:defRPr sz="1200" kern="1200">
+                <a:solidFill>
+                  <a:schemeClr val="tx1"/>
+                </a:solidFill>
+                <a:latin typeface="+mn-lt"/>
+                <a:ea typeface="+mn-ea"/>
+                <a:cs typeface="+mn-cs"/>
+              </a:defRPr>
+            </a:lvl5pPr>
+            <a:lvl6pPr marL="2400000" indent="-228600" algn="l" defTabSz="457200" rtl="0" eaLnBrk="1" latinLnBrk="0" hangingPunct="1">
+              <a:spcBef>
+                <a:spcPct val="20000"/>
+              </a:spcBef>
+              <a:spcAft>
+                <a:spcPts val="600"/>
+              </a:spcAft>
+              <a:buClr>
+                <a:schemeClr val="accent1"/>
+              </a:buClr>
+              <a:buFont typeface="Wingdings 2" charset="2"/>
+              <a:buChar char=""/>
+              <a:defRPr sz="1200" kern="1200">
+                <a:solidFill>
+                  <a:schemeClr val="tx1"/>
+                </a:solidFill>
+                <a:latin typeface="+mn-lt"/>
+                <a:ea typeface="+mn-ea"/>
+                <a:cs typeface="+mn-cs"/>
+              </a:defRPr>
+            </a:lvl6pPr>
+            <a:lvl7pPr marL="2800000" indent="-228600" algn="l" defTabSz="457200" rtl="0" eaLnBrk="1" latinLnBrk="0" hangingPunct="1">
+              <a:spcBef>
+                <a:spcPct val="20000"/>
+              </a:spcBef>
+              <a:spcAft>
+                <a:spcPts val="600"/>
+              </a:spcAft>
+              <a:buClr>
+                <a:schemeClr val="accent1"/>
+              </a:buClr>
+              <a:buFont typeface="Wingdings 2" charset="2"/>
+              <a:buChar char=""/>
+              <a:defRPr sz="1200" kern="1200">
+                <a:solidFill>
+                  <a:schemeClr val="tx1"/>
+                </a:solidFill>
+                <a:latin typeface="+mn-lt"/>
+                <a:ea typeface="+mn-ea"/>
+                <a:cs typeface="+mn-cs"/>
+              </a:defRPr>
+            </a:lvl7pPr>
+            <a:lvl8pPr marL="3200000" indent="-228600" algn="l" defTabSz="457200" rtl="0" eaLnBrk="1" latinLnBrk="0" hangingPunct="1">
+              <a:spcBef>
+                <a:spcPct val="20000"/>
+              </a:spcBef>
+              <a:spcAft>
+                <a:spcPts val="600"/>
+              </a:spcAft>
+              <a:buClr>
+                <a:schemeClr val="accent1"/>
+              </a:buClr>
+              <a:buFont typeface="Wingdings 2" charset="2"/>
+              <a:buChar char=""/>
+              <a:defRPr sz="1200" kern="1200">
+                <a:solidFill>
+                  <a:schemeClr val="tx1"/>
+                </a:solidFill>
+                <a:latin typeface="+mn-lt"/>
+                <a:ea typeface="+mn-ea"/>
+                <a:cs typeface="+mn-cs"/>
+              </a:defRPr>
+            </a:lvl8pPr>
+            <a:lvl9pPr marL="3600000" indent="-228600" algn="l" defTabSz="457200" rtl="0" eaLnBrk="1" latinLnBrk="0" hangingPunct="1">
+              <a:spcBef>
+                <a:spcPct val="20000"/>
+              </a:spcBef>
+              <a:spcAft>
+                <a:spcPts val="600"/>
+              </a:spcAft>
+              <a:buClr>
+                <a:schemeClr val="accent1"/>
+              </a:buClr>
+              <a:buFont typeface="Wingdings 2" charset="2"/>
+              <a:buChar char=""/>
+              <a:defRPr sz="1200" kern="1200">
+                <a:solidFill>
+                  <a:schemeClr val="tx1"/>
+                </a:solidFill>
+                <a:latin typeface="+mn-lt"/>
+                <a:ea typeface="+mn-ea"/>
+                <a:cs typeface="+mn-cs"/>
+              </a:defRPr>
+            </a:lvl9pPr>
+          </a:lstStyle>
+          <a:p>
+            <a:pPr marL="0" indent="0">
+              <a:buFont typeface="Wingdings 2" charset="2"/>
+              <a:buNone/>
+            </a:pPr>
             <a:r>
               <a:rPr lang="en-US" dirty="0"/>
-              <a:t>The correlation coefficient between gas price and auto sales is 0.51</a:t>
-            </a:r>
-          </a:p>
-          <a:p>
+              <a:t> </a:t>
+            </a:r>
+            <a:r>
+              <a:rPr lang="en-US" sz="3200" u="sng" dirty="0"/>
+              <a:t>Difficulties</a:t>
+            </a:r>
+          </a:p>
+          <a:p>
+            <a:pPr lvl="1"/>
             <a:r>
               <a:rPr lang="en-US" dirty="0"/>
-              <a:t>The r-squared is: 0.25751172565618313</a:t>
-            </a:r>
+              <a:t> Obtaining Data</a:t>
+            </a:r>
+          </a:p>
+          <a:p>
+            <a:pPr lvl="1"/>
+            <a:r>
+              <a:rPr lang="en-US" dirty="0"/>
+              <a:t>Cleaning/Formatting Data</a:t>
+            </a:r>
+          </a:p>
+          <a:p>
+            <a:pPr lvl="1"/>
+            <a:r>
+              <a:rPr lang="en-US" dirty="0"/>
+              <a:t>GitHub</a:t>
+            </a:r>
+          </a:p>
+          <a:p>
+            <a:pPr lvl="1"/>
+            <a:endParaRPr lang="en-US" dirty="0"/>
+          </a:p>
+          <a:p>
+            <a:pPr lvl="1"/>
+            <a:r>
+              <a:rPr lang="en-US" dirty="0"/>
+              <a:t>COMMUNICATION THE KEY !!!</a:t>
+            </a:r>
+          </a:p>
+          <a:p>
+            <a:pPr marL="457200" lvl="1" indent="0">
+              <a:buFont typeface="Wingdings 2" charset="2"/>
+              <a:buNone/>
+            </a:pPr>
+            <a:endParaRPr lang="en-US" dirty="0"/>
+          </a:p>
+          <a:p>
+            <a:endParaRPr lang="en-US" dirty="0"/>
           </a:p>
         </p:txBody>
       </p:sp>
-      <p:pic>
-        <p:nvPicPr>
-          <p:cNvPr id="7" name="Picture 6" descr="Chart, scatter chart&#10;&#10;Description automatically generated">
-            <a:extLst>
-              <a:ext uri="{FF2B5EF4-FFF2-40B4-BE49-F238E27FC236}">
-                <a16:creationId xmlns:a16="http://schemas.microsoft.com/office/drawing/2014/main" id="{6A2B2F4A-63F7-4E64-A541-CD395A03F314}"/>
-              </a:ext>
-            </a:extLst>
-          </p:cNvPr>
-          <p:cNvPicPr>
-            <a:picLocks noChangeAspect="1"/>
-          </p:cNvPicPr>
-          <p:nvPr/>
-        </p:nvPicPr>
-        <p:blipFill>
-          <a:blip r:embed="rId5"/>
-          <a:stretch>
-            <a:fillRect/>
-          </a:stretch>
-        </p:blipFill>
-        <p:spPr>
-          <a:xfrm>
-            <a:off x="8666139" y="1999718"/>
-            <a:ext cx="3302141" cy="2194581"/>
-          </a:xfrm>
-          <a:prstGeom prst="rect">
-            <a:avLst/>
-          </a:prstGeom>
-        </p:spPr>
-      </p:pic>
-      <p:sp>
-        <p:nvSpPr>
-          <p:cNvPr id="8" name="TextBox 7">
-            <a:extLst>
-              <a:ext uri="{FF2B5EF4-FFF2-40B4-BE49-F238E27FC236}">
-                <a16:creationId xmlns:a16="http://schemas.microsoft.com/office/drawing/2014/main" id="{6EA37049-2858-47B6-9723-6C2F7C144F3D}"/>
-              </a:ext>
-            </a:extLst>
-          </p:cNvPr>
-          <p:cNvSpPr txBox="1"/>
-          <p:nvPr/>
-        </p:nvSpPr>
-        <p:spPr>
-          <a:xfrm>
-            <a:off x="4303161" y="5127838"/>
-            <a:ext cx="7888840" cy="646331"/>
-          </a:xfrm>
-          <a:prstGeom prst="rect">
-            <a:avLst/>
-          </a:prstGeom>
-          <a:noFill/>
-        </p:spPr>
-        <p:txBody>
-          <a:bodyPr wrap="square" rtlCol="0">
-            <a:spAutoFit/>
-          </a:bodyPr>
-          <a:lstStyle/>
-          <a:p>
-            <a:r>
-              <a:rPr lang="en-US" dirty="0"/>
-              <a:t>The correlation coefficient between gas price and auto sales is -0.02</a:t>
-            </a:r>
-          </a:p>
-          <a:p>
-            <a:r>
-              <a:rPr lang="en-US" dirty="0"/>
-              <a:t>The r-squared is: 0.00044488448267310574</a:t>
-            </a:r>
-          </a:p>
-        </p:txBody>
-      </p:sp>
-      <p:pic>
-        <p:nvPicPr>
-          <p:cNvPr id="6" name="Picture 5" descr="Diagram, schematic&#10;&#10;Description automatically generated">
-            <a:extLst>
-              <a:ext uri="{FF2B5EF4-FFF2-40B4-BE49-F238E27FC236}">
-                <a16:creationId xmlns:a16="http://schemas.microsoft.com/office/drawing/2014/main" id="{0225A042-D4CA-4895-9734-3A7F1CF188F7}"/>
-              </a:ext>
-            </a:extLst>
-          </p:cNvPr>
-          <p:cNvPicPr>
-            <a:picLocks noChangeAspect="1"/>
-          </p:cNvPicPr>
-          <p:nvPr/>
-        </p:nvPicPr>
-        <p:blipFill>
-          <a:blip r:embed="rId6"/>
-          <a:stretch>
-            <a:fillRect/>
-          </a:stretch>
-        </p:blipFill>
-        <p:spPr>
-          <a:xfrm>
-            <a:off x="4917339" y="2431927"/>
-            <a:ext cx="6705600" cy="3994595"/>
-          </a:xfrm>
-          <a:prstGeom prst="rect">
-            <a:avLst/>
-          </a:prstGeom>
-        </p:spPr>
-      </p:pic>
     </p:spTree>
     <p:extLst>
       <p:ext uri="{BB962C8B-B14F-4D97-AF65-F5344CB8AC3E}">
@@ -10157,8 +10048,8 @@
         </p:nvSpPr>
         <p:spPr>
           <a:xfrm>
-            <a:off x="372256" y="430012"/>
-            <a:ext cx="10572000" cy="2971051"/>
+            <a:off x="239734" y="323995"/>
+            <a:ext cx="10572000" cy="1743345"/>
           </a:xfrm>
         </p:spPr>
         <p:txBody>
@@ -10418,305 +10309,6 @@
           <a:chExt cx="0" cy="0"/>
         </a:xfrm>
       </p:grpSpPr>
-      <p:sp useBgFill="1">
-        <p:nvSpPr>
-          <p:cNvPr id="11" name="Rectangle 10">
-            <a:extLst>
-              <a:ext uri="{FF2B5EF4-FFF2-40B4-BE49-F238E27FC236}">
-                <a16:creationId xmlns:a16="http://schemas.microsoft.com/office/drawing/2014/main" id="{089A69AF-D57B-49B4-886C-D4A5DC194421}"/>
-              </a:ext>
-              <a:ext uri="{C183D7F6-B498-43B3-948B-1728B52AA6E4}">
-                <adec:decorative xmlns:adec="http://schemas.microsoft.com/office/drawing/2017/decorative" val="1"/>
-              </a:ext>
-            </a:extLst>
-          </p:cNvPr>
-          <p:cNvSpPr>
-            <a:spLocks noGrp="1" noRot="1" noChangeAspect="1" noMove="1" noResize="1" noEditPoints="1" noAdjustHandles="1" noChangeArrowheads="1" noChangeShapeType="1" noTextEdit="1"/>
-          </p:cNvSpPr>
-          <p:nvPr>
-            <p:extLst>
-              <p:ext uri="{386F3935-93C4-4BCD-93E2-E3B085C9AB24}">
-                <p16:designElem xmlns:p16="http://schemas.microsoft.com/office/powerpoint/2015/main" val="1"/>
-              </p:ext>
-            </p:extLst>
-          </p:nvPr>
-        </p:nvSpPr>
-        <p:spPr>
-          <a:xfrm>
-            <a:off x="0" y="0"/>
-            <a:ext cx="12192000" cy="6858000"/>
-          </a:xfrm>
-          <a:prstGeom prst="rect">
-            <a:avLst/>
-          </a:prstGeom>
-          <a:ln>
-            <a:noFill/>
-          </a:ln>
-        </p:spPr>
-        <p:style>
-          <a:lnRef idx="2">
-            <a:schemeClr val="accent1">
-              <a:shade val="50000"/>
-            </a:schemeClr>
-          </a:lnRef>
-          <a:fillRef idx="1">
-            <a:schemeClr val="accent1"/>
-          </a:fillRef>
-          <a:effectRef idx="0">
-            <a:schemeClr val="accent1"/>
-          </a:effectRef>
-          <a:fontRef idx="minor">
-            <a:schemeClr val="lt1"/>
-          </a:fontRef>
-        </p:style>
-        <p:txBody>
-          <a:bodyPr rtlCol="0" anchor="ctr"/>
-          <a:lstStyle/>
-          <a:p>
-            <a:pPr algn="ctr"/>
-            <a:endParaRPr lang="en-US"/>
-          </a:p>
-        </p:txBody>
-      </p:sp>
-      <p:sp>
-        <p:nvSpPr>
-          <p:cNvPr id="13" name="Freeform: Shape 12">
-            <a:extLst>
-              <a:ext uri="{FF2B5EF4-FFF2-40B4-BE49-F238E27FC236}">
-                <a16:creationId xmlns:a16="http://schemas.microsoft.com/office/drawing/2014/main" id="{CABDC08D-6093-4397-92D4-54D00E2BB1C2}"/>
-              </a:ext>
-              <a:ext uri="{C183D7F6-B498-43B3-948B-1728B52AA6E4}">
-                <adec:decorative xmlns:adec="http://schemas.microsoft.com/office/drawing/2017/decorative" val="1"/>
-              </a:ext>
-            </a:extLst>
-          </p:cNvPr>
-          <p:cNvSpPr>
-            <a:spLocks noGrp="1" noRot="1" noChangeAspect="1" noMove="1" noResize="1" noEditPoints="1" noAdjustHandles="1" noChangeArrowheads="1" noChangeShapeType="1" noTextEdit="1"/>
-          </p:cNvSpPr>
-          <p:nvPr>
-            <p:extLst>
-              <p:ext uri="{386F3935-93C4-4BCD-93E2-E3B085C9AB24}">
-                <p16:designElem xmlns:p16="http://schemas.microsoft.com/office/powerpoint/2015/main" val="1"/>
-              </p:ext>
-            </p:extLst>
-          </p:nvPr>
-        </p:nvSpPr>
-        <p:spPr bwMode="auto">
-          <a:xfrm rot="16200000">
-            <a:off x="-650724" y="650724"/>
-            <a:ext cx="6858000" cy="5556552"/>
-          </a:xfrm>
-          <a:custGeom>
-            <a:avLst/>
-            <a:gdLst>
-              <a:gd name="connsiteX0" fmla="*/ 6858000 w 6858000"/>
-              <a:gd name="connsiteY0" fmla="*/ 3445704 h 5556552"/>
-              <a:gd name="connsiteX1" fmla="*/ 3829242 w 6858000"/>
-              <a:gd name="connsiteY1" fmla="*/ 5433322 h 5556552"/>
-              <a:gd name="connsiteX2" fmla="*/ 3827369 w 6858000"/>
-              <a:gd name="connsiteY2" fmla="*/ 5434867 h 5556552"/>
-              <a:gd name="connsiteX3" fmla="*/ 3824583 w 6858000"/>
-              <a:gd name="connsiteY3" fmla="*/ 5436378 h 5556552"/>
-              <a:gd name="connsiteX4" fmla="*/ 3798693 w 6858000"/>
-              <a:gd name="connsiteY4" fmla="*/ 5453370 h 5556552"/>
-              <a:gd name="connsiteX5" fmla="*/ 3785011 w 6858000"/>
-              <a:gd name="connsiteY5" fmla="*/ 5457858 h 5556552"/>
-              <a:gd name="connsiteX6" fmla="*/ 3706339 w 6858000"/>
-              <a:gd name="connsiteY6" fmla="*/ 5500559 h 5556552"/>
-              <a:gd name="connsiteX7" fmla="*/ 3428998 w 6858000"/>
-              <a:gd name="connsiteY7" fmla="*/ 5556552 h 5556552"/>
-              <a:gd name="connsiteX8" fmla="*/ 3151658 w 6858000"/>
-              <a:gd name="connsiteY8" fmla="*/ 5500559 h 5556552"/>
-              <a:gd name="connsiteX9" fmla="*/ 3072996 w 6858000"/>
-              <a:gd name="connsiteY9" fmla="*/ 5457863 h 5556552"/>
-              <a:gd name="connsiteX10" fmla="*/ 3059298 w 6858000"/>
-              <a:gd name="connsiteY10" fmla="*/ 5453370 h 5556552"/>
-              <a:gd name="connsiteX11" fmla="*/ 3033383 w 6858000"/>
-              <a:gd name="connsiteY11" fmla="*/ 5436362 h 5556552"/>
-              <a:gd name="connsiteX12" fmla="*/ 3030627 w 6858000"/>
-              <a:gd name="connsiteY12" fmla="*/ 5434867 h 5556552"/>
-              <a:gd name="connsiteX13" fmla="*/ 3028775 w 6858000"/>
-              <a:gd name="connsiteY13" fmla="*/ 5433338 h 5556552"/>
-              <a:gd name="connsiteX14" fmla="*/ 0 w 6858000"/>
-              <a:gd name="connsiteY14" fmla="*/ 3445704 h 5556552"/>
-              <a:gd name="connsiteX15" fmla="*/ 6858000 w 6858000"/>
-              <a:gd name="connsiteY15" fmla="*/ 0 h 5556552"/>
-              <a:gd name="connsiteX16" fmla="*/ 6858000 w 6858000"/>
-              <a:gd name="connsiteY16" fmla="*/ 349336 h 5556552"/>
-              <a:gd name="connsiteX17" fmla="*/ 6858000 w 6858000"/>
-              <a:gd name="connsiteY17" fmla="*/ 3445703 h 5556552"/>
-              <a:gd name="connsiteX18" fmla="*/ 0 w 6858000"/>
-              <a:gd name="connsiteY18" fmla="*/ 3445703 h 5556552"/>
-              <a:gd name="connsiteX19" fmla="*/ 0 w 6858000"/>
-              <a:gd name="connsiteY19" fmla="*/ 0 h 5556552"/>
-            </a:gdLst>
-            <a:ahLst/>
-            <a:cxnLst>
-              <a:cxn ang="0">
-                <a:pos x="connsiteX0" y="connsiteY0"/>
-              </a:cxn>
-              <a:cxn ang="0">
-                <a:pos x="connsiteX1" y="connsiteY1"/>
-              </a:cxn>
-              <a:cxn ang="0">
-                <a:pos x="connsiteX2" y="connsiteY2"/>
-              </a:cxn>
-              <a:cxn ang="0">
-                <a:pos x="connsiteX3" y="connsiteY3"/>
-              </a:cxn>
-              <a:cxn ang="0">
-                <a:pos x="connsiteX4" y="connsiteY4"/>
-              </a:cxn>
-              <a:cxn ang="0">
-                <a:pos x="connsiteX5" y="connsiteY5"/>
-              </a:cxn>
-              <a:cxn ang="0">
-                <a:pos x="connsiteX6" y="connsiteY6"/>
-              </a:cxn>
-              <a:cxn ang="0">
-                <a:pos x="connsiteX7" y="connsiteY7"/>
-              </a:cxn>
-              <a:cxn ang="0">
-                <a:pos x="connsiteX8" y="connsiteY8"/>
-              </a:cxn>
-              <a:cxn ang="0">
-                <a:pos x="connsiteX9" y="connsiteY9"/>
-              </a:cxn>
-              <a:cxn ang="0">
-                <a:pos x="connsiteX10" y="connsiteY10"/>
-              </a:cxn>
-              <a:cxn ang="0">
-                <a:pos x="connsiteX11" y="connsiteY11"/>
-              </a:cxn>
-              <a:cxn ang="0">
-                <a:pos x="connsiteX12" y="connsiteY12"/>
-              </a:cxn>
-              <a:cxn ang="0">
-                <a:pos x="connsiteX13" y="connsiteY13"/>
-              </a:cxn>
-              <a:cxn ang="0">
-                <a:pos x="connsiteX14" y="connsiteY14"/>
-              </a:cxn>
-              <a:cxn ang="0">
-                <a:pos x="connsiteX15" y="connsiteY15"/>
-              </a:cxn>
-              <a:cxn ang="0">
-                <a:pos x="connsiteX16" y="connsiteY16"/>
-              </a:cxn>
-              <a:cxn ang="0">
-                <a:pos x="connsiteX17" y="connsiteY17"/>
-              </a:cxn>
-              <a:cxn ang="0">
-                <a:pos x="connsiteX18" y="connsiteY18"/>
-              </a:cxn>
-              <a:cxn ang="0">
-                <a:pos x="connsiteX19" y="connsiteY19"/>
-              </a:cxn>
-            </a:cxnLst>
-            <a:rect l="l" t="t" r="r" b="b"/>
-            <a:pathLst>
-              <a:path w="6858000" h="5556552">
-                <a:moveTo>
-                  <a:pt x="6858000" y="3445704"/>
-                </a:moveTo>
-                <a:lnTo>
-                  <a:pt x="3829242" y="5433322"/>
-                </a:lnTo>
-                <a:lnTo>
-                  <a:pt x="3827369" y="5434867"/>
-                </a:lnTo>
-                <a:lnTo>
-                  <a:pt x="3824583" y="5436378"/>
-                </a:lnTo>
-                <a:lnTo>
-                  <a:pt x="3798693" y="5453370"/>
-                </a:lnTo>
-                <a:lnTo>
-                  <a:pt x="3785011" y="5457858"/>
-                </a:lnTo>
-                <a:lnTo>
-                  <a:pt x="3706339" y="5500559"/>
-                </a:lnTo>
-                <a:cubicBezTo>
-                  <a:pt x="3621096" y="5536614"/>
-                  <a:pt x="3527375" y="5556552"/>
-                  <a:pt x="3428998" y="5556552"/>
-                </a:cubicBezTo>
-                <a:cubicBezTo>
-                  <a:pt x="3330621" y="5556552"/>
-                  <a:pt x="3236901" y="5536614"/>
-                  <a:pt x="3151658" y="5500559"/>
-                </a:cubicBezTo>
-                <a:lnTo>
-                  <a:pt x="3072996" y="5457863"/>
-                </a:lnTo>
-                <a:lnTo>
-                  <a:pt x="3059298" y="5453370"/>
-                </a:lnTo>
-                <a:lnTo>
-                  <a:pt x="3033383" y="5436362"/>
-                </a:lnTo>
-                <a:lnTo>
-                  <a:pt x="3030627" y="5434867"/>
-                </a:lnTo>
-                <a:lnTo>
-                  <a:pt x="3028775" y="5433338"/>
-                </a:lnTo>
-                <a:lnTo>
-                  <a:pt x="0" y="3445704"/>
-                </a:lnTo>
-                <a:close/>
-                <a:moveTo>
-                  <a:pt x="6858000" y="0"/>
-                </a:moveTo>
-                <a:lnTo>
-                  <a:pt x="6858000" y="349336"/>
-                </a:lnTo>
-                <a:lnTo>
-                  <a:pt x="6858000" y="3445703"/>
-                </a:lnTo>
-                <a:lnTo>
-                  <a:pt x="0" y="3445703"/>
-                </a:lnTo>
-                <a:lnTo>
-                  <a:pt x="0" y="0"/>
-                </a:lnTo>
-                <a:close/>
-              </a:path>
-            </a:pathLst>
-          </a:custGeom>
-          <a:ln>
-            <a:noFill/>
-          </a:ln>
-          <a:effectLst/>
-          <a:extLst>
-            <a:ext uri="{91240B29-F687-4f45-9708-019B960494DF}">
-              <a14:hiddenLine xmlns="" xmlns:a14="http://schemas.microsoft.com/office/drawing/2010/main" xmlns:p14="http://schemas.microsoft.com/office/powerpoint/2010/main" xmlns:a16="http://schemas.microsoft.com/office/drawing/2014/main" w="9525">
-                <a:solidFill>
-                  <a:srgbClr val="000000"/>
-                </a:solidFill>
-                <a:round/>
-                <a:headEnd/>
-                <a:tailEnd/>
-              </a14:hiddenLine>
-            </a:ext>
-          </a:extLst>
-        </p:spPr>
-        <p:style>
-          <a:lnRef idx="1">
-            <a:schemeClr val="accent1"/>
-          </a:lnRef>
-          <a:fillRef idx="3">
-            <a:schemeClr val="accent1"/>
-          </a:fillRef>
-          <a:effectRef idx="2">
-            <a:schemeClr val="accent1"/>
-          </a:effectRef>
-          <a:fontRef idx="minor">
-            <a:schemeClr val="lt1"/>
-          </a:fontRef>
-        </p:style>
-      </p:sp>
       <p:sp>
         <p:nvSpPr>
           <p:cNvPr id="2" name="Title 1">
@@ -11725,6 +11317,61 @@
           </a:p>
         </p:txBody>
       </p:sp>
+      <p:sp>
+        <p:nvSpPr>
+          <p:cNvPr id="14" name="Content Placeholder 2">
+            <a:extLst>
+              <a:ext uri="{FF2B5EF4-FFF2-40B4-BE49-F238E27FC236}">
+                <a16:creationId xmlns:a16="http://schemas.microsoft.com/office/drawing/2014/main" id="{8C113520-4215-47F5-A1DB-C3CC7BF12049}"/>
+              </a:ext>
+            </a:extLst>
+          </p:cNvPr>
+          <p:cNvSpPr>
+            <a:spLocks noGrp="1"/>
+          </p:cNvSpPr>
+          <p:nvPr>
+            <p:ph idx="1"/>
+          </p:nvPr>
+        </p:nvSpPr>
+        <p:spPr>
+          <a:xfrm>
+            <a:off x="489528" y="4089095"/>
+            <a:ext cx="4188664" cy="2254928"/>
+          </a:xfrm>
+        </p:spPr>
+        <p:txBody>
+          <a:bodyPr>
+            <a:normAutofit/>
+          </a:bodyPr>
+          <a:lstStyle/>
+          <a:p>
+            <a:pPr>
+              <a:buFont typeface="Wingdings" panose="05000000000000000000" pitchFamily="2" charset="2"/>
+              <a:buChar char="Ø"/>
+            </a:pPr>
+            <a:r>
+              <a:rPr lang="en-US" sz="2800" b="1" dirty="0"/>
+              <a:t>Hooray for</a:t>
+            </a:r>
+          </a:p>
+          <a:p>
+            <a:pPr marL="0" indent="0">
+              <a:buNone/>
+            </a:pPr>
+            <a:r>
+              <a:rPr lang="en-US" sz="2800" b="1" dirty="0"/>
+              <a:t>   Nested For Loops!</a:t>
+            </a:r>
+          </a:p>
+          <a:p>
+            <a:pPr>
+              <a:buFont typeface="Wingdings" panose="05000000000000000000" pitchFamily="2" charset="2"/>
+              <a:buChar char="Ø"/>
+            </a:pPr>
+            <a:endParaRPr lang="en-US" sz="2800" b="1" dirty="0"/>
+          </a:p>
+        </p:txBody>
+      </p:sp>
       <p:pic>
         <p:nvPicPr>
           <p:cNvPr id="5" name="Picture 4">
@@ -11865,61 +11512,6 @@
           </a:p>
         </p:txBody>
       </p:sp>
-      <p:sp>
-        <p:nvSpPr>
-          <p:cNvPr id="14" name="Content Placeholder 2">
-            <a:extLst>
-              <a:ext uri="{FF2B5EF4-FFF2-40B4-BE49-F238E27FC236}">
-                <a16:creationId xmlns:a16="http://schemas.microsoft.com/office/drawing/2014/main" id="{8C113520-4215-47F5-A1DB-C3CC7BF12049}"/>
-              </a:ext>
-            </a:extLst>
-          </p:cNvPr>
-          <p:cNvSpPr>
-            <a:spLocks noGrp="1"/>
-          </p:cNvSpPr>
-          <p:nvPr>
-            <p:ph idx="1"/>
-          </p:nvPr>
-        </p:nvSpPr>
-        <p:spPr>
-          <a:xfrm>
-            <a:off x="489528" y="4089095"/>
-            <a:ext cx="4188664" cy="2254928"/>
-          </a:xfrm>
-        </p:spPr>
-        <p:txBody>
-          <a:bodyPr>
-            <a:normAutofit/>
-          </a:bodyPr>
-          <a:lstStyle/>
-          <a:p>
-            <a:pPr>
-              <a:buFont typeface="Wingdings" panose="05000000000000000000" pitchFamily="2" charset="2"/>
-              <a:buChar char="Ø"/>
-            </a:pPr>
-            <a:r>
-              <a:rPr lang="en-US" sz="2800" b="1" dirty="0"/>
-              <a:t>Hooray for</a:t>
-            </a:r>
-          </a:p>
-          <a:p>
-            <a:pPr marL="0" indent="0">
-              <a:buNone/>
-            </a:pPr>
-            <a:r>
-              <a:rPr lang="en-US" sz="2800" b="1" dirty="0"/>
-              <a:t>   Nested For Loops!</a:t>
-            </a:r>
-          </a:p>
-          <a:p>
-            <a:pPr>
-              <a:buFont typeface="Wingdings" panose="05000000000000000000" pitchFamily="2" charset="2"/>
-              <a:buChar char="Ø"/>
-            </a:pPr>
-            <a:endParaRPr lang="en-US" sz="2800" b="1" dirty="0"/>
-          </a:p>
-        </p:txBody>
-      </p:sp>
     </p:spTree>
     <p:extLst>
       <p:ext uri="{BB962C8B-B14F-4D97-AF65-F5344CB8AC3E}">
@@ -11984,36 +11576,6 @@
           </a:p>
         </p:txBody>
       </p:sp>
-      <p:pic>
-        <p:nvPicPr>
-          <p:cNvPr id="5" name="Picture 4">
-            <a:extLst>
-              <a:ext uri="{FF2B5EF4-FFF2-40B4-BE49-F238E27FC236}">
-                <a16:creationId xmlns:a16="http://schemas.microsoft.com/office/drawing/2014/main" id="{D5F6873D-BFC8-AB41-88B9-5689722B12F1}"/>
-              </a:ext>
-            </a:extLst>
-          </p:cNvPr>
-          <p:cNvPicPr>
-            <a:picLocks noChangeAspect="1"/>
-          </p:cNvPicPr>
-          <p:nvPr/>
-        </p:nvPicPr>
-        <p:blipFill>
-          <a:blip r:embed="rId2"/>
-          <a:stretch>
-            <a:fillRect/>
-          </a:stretch>
-        </p:blipFill>
-        <p:spPr>
-          <a:xfrm>
-            <a:off x="11477296" y="0"/>
-            <a:ext cx="627118" cy="627118"/>
-          </a:xfrm>
-          <a:prstGeom prst="rect">
-            <a:avLst/>
-          </a:prstGeom>
-        </p:spPr>
-      </p:pic>
       <p:graphicFrame>
         <p:nvGraphicFramePr>
           <p:cNvPr id="23" name="Content Placeholder 2">
@@ -12036,10 +11598,40 @@
         </p:xfrm>
         <a:graphic>
           <a:graphicData uri="http://schemas.openxmlformats.org/drawingml/2006/diagram">
-            <dgm:relIds xmlns:dgm="http://schemas.openxmlformats.org/drawingml/2006/diagram" xmlns:r="http://schemas.openxmlformats.org/officeDocument/2006/relationships" r:dm="rId3" r:lo="rId4" r:qs="rId5" r:cs="rId6"/>
+            <dgm:relIds xmlns:dgm="http://schemas.openxmlformats.org/drawingml/2006/diagram" xmlns:r="http://schemas.openxmlformats.org/officeDocument/2006/relationships" r:dm="rId2" r:lo="rId3" r:qs="rId4" r:cs="rId5"/>
           </a:graphicData>
         </a:graphic>
       </p:graphicFrame>
+      <p:pic>
+        <p:nvPicPr>
+          <p:cNvPr id="5" name="Picture 4">
+            <a:extLst>
+              <a:ext uri="{FF2B5EF4-FFF2-40B4-BE49-F238E27FC236}">
+                <a16:creationId xmlns:a16="http://schemas.microsoft.com/office/drawing/2014/main" id="{D5F6873D-BFC8-AB41-88B9-5689722B12F1}"/>
+              </a:ext>
+            </a:extLst>
+          </p:cNvPr>
+          <p:cNvPicPr>
+            <a:picLocks noChangeAspect="1"/>
+          </p:cNvPicPr>
+          <p:nvPr/>
+        </p:nvPicPr>
+        <p:blipFill>
+          <a:blip r:embed="rId7"/>
+          <a:stretch>
+            <a:fillRect/>
+          </a:stretch>
+        </p:blipFill>
+        <p:spPr>
+          <a:xfrm>
+            <a:off x="11477296" y="0"/>
+            <a:ext cx="627118" cy="627118"/>
+          </a:xfrm>
+          <a:prstGeom prst="rect">
+            <a:avLst/>
+          </a:prstGeom>
+        </p:spPr>
+      </p:pic>
       <p:pic>
         <p:nvPicPr>
           <p:cNvPr id="7" name="Picture 6" descr="Graphical user interface, application&#10;&#10;Description automatically generated">
@@ -12108,200 +11700,6 @@
           <a:chExt cx="0" cy="0"/>
         </a:xfrm>
       </p:grpSpPr>
-      <p:sp useBgFill="1">
-        <p:nvSpPr>
-          <p:cNvPr id="16" name="Rectangle 15">
-            <a:extLst>
-              <a:ext uri="{FF2B5EF4-FFF2-40B4-BE49-F238E27FC236}">
-                <a16:creationId xmlns:a16="http://schemas.microsoft.com/office/drawing/2014/main" id="{A1DFCBE5-52C1-48A9-89CF-E7D68CCA1620}"/>
-              </a:ext>
-              <a:ext uri="{C183D7F6-B498-43B3-948B-1728B52AA6E4}">
-                <adec:decorative xmlns:adec="http://schemas.microsoft.com/office/drawing/2017/decorative" val="1"/>
-              </a:ext>
-            </a:extLst>
-          </p:cNvPr>
-          <p:cNvSpPr>
-            <a:spLocks noGrp="1" noRot="1" noChangeAspect="1" noMove="1" noResize="1" noEditPoints="1" noAdjustHandles="1" noChangeArrowheads="1" noChangeShapeType="1" noTextEdit="1"/>
-          </p:cNvSpPr>
-          <p:nvPr>
-            <p:extLst>
-              <p:ext uri="{386F3935-93C4-4BCD-93E2-E3B085C9AB24}">
-                <p16:designElem xmlns:p16="http://schemas.microsoft.com/office/powerpoint/2015/main" val="1"/>
-              </p:ext>
-            </p:extLst>
-          </p:nvPr>
-        </p:nvSpPr>
-        <p:spPr>
-          <a:xfrm>
-            <a:off x="0" y="0"/>
-            <a:ext cx="12188952" cy="6858000"/>
-          </a:xfrm>
-          <a:prstGeom prst="rect">
-            <a:avLst/>
-          </a:prstGeom>
-          <a:ln>
-            <a:noFill/>
-          </a:ln>
-        </p:spPr>
-        <p:style>
-          <a:lnRef idx="2">
-            <a:schemeClr val="accent1">
-              <a:shade val="50000"/>
-            </a:schemeClr>
-          </a:lnRef>
-          <a:fillRef idx="1">
-            <a:schemeClr val="accent1"/>
-          </a:fillRef>
-          <a:effectRef idx="0">
-            <a:schemeClr val="accent1"/>
-          </a:effectRef>
-          <a:fontRef idx="minor">
-            <a:schemeClr val="lt1"/>
-          </a:fontRef>
-        </p:style>
-        <p:txBody>
-          <a:bodyPr rtlCol="0" anchor="ctr"/>
-          <a:lstStyle/>
-          <a:p>
-            <a:pPr algn="ctr"/>
-            <a:endParaRPr lang="en-US"/>
-          </a:p>
-        </p:txBody>
-      </p:sp>
-      <p:sp>
-        <p:nvSpPr>
-          <p:cNvPr id="18" name="Freeform: Shape 17">
-            <a:extLst>
-              <a:ext uri="{FF2B5EF4-FFF2-40B4-BE49-F238E27FC236}">
-                <a16:creationId xmlns:a16="http://schemas.microsoft.com/office/drawing/2014/main" id="{06AB74CA-E76D-4922-91FE-A4AAF0487CE8}"/>
-              </a:ext>
-              <a:ext uri="{C183D7F6-B498-43B3-948B-1728B52AA6E4}">
-                <adec:decorative xmlns:adec="http://schemas.microsoft.com/office/drawing/2017/decorative" val="1"/>
-              </a:ext>
-            </a:extLst>
-          </p:cNvPr>
-          <p:cNvSpPr>
-            <a:spLocks noGrp="1" noRot="1" noChangeAspect="1" noMove="1" noResize="1" noEditPoints="1" noAdjustHandles="1" noChangeArrowheads="1" noChangeShapeType="1" noTextEdit="1"/>
-          </p:cNvSpPr>
-          <p:nvPr>
-            <p:extLst>
-              <p:ext uri="{386F3935-93C4-4BCD-93E2-E3B085C9AB24}">
-                <p16:designElem xmlns:p16="http://schemas.microsoft.com/office/powerpoint/2015/main" val="1"/>
-              </p:ext>
-            </p:extLst>
-          </p:nvPr>
-        </p:nvSpPr>
-        <p:spPr>
-          <a:xfrm>
-            <a:off x="0" y="3647203"/>
-            <a:ext cx="11707367" cy="2572622"/>
-          </a:xfrm>
-          <a:custGeom>
-            <a:avLst/>
-            <a:gdLst>
-              <a:gd name="connsiteX0" fmla="*/ 0 w 11707367"/>
-              <a:gd name="connsiteY0" fmla="*/ 0 h 2572622"/>
-              <a:gd name="connsiteX1" fmla="*/ 1888420 w 11707367"/>
-              <a:gd name="connsiteY1" fmla="*/ 0 h 2572622"/>
-              <a:gd name="connsiteX2" fmla="*/ 2198560 w 11707367"/>
-              <a:gd name="connsiteY2" fmla="*/ 310139 h 2572622"/>
-              <a:gd name="connsiteX3" fmla="*/ 2425431 w 11707367"/>
-              <a:gd name="connsiteY3" fmla="*/ 310139 h 2572622"/>
-              <a:gd name="connsiteX4" fmla="*/ 2735570 w 11707367"/>
-              <a:gd name="connsiteY4" fmla="*/ 0 h 2572622"/>
-              <a:gd name="connsiteX5" fmla="*/ 11707367 w 11707367"/>
-              <a:gd name="connsiteY5" fmla="*/ 0 h 2572622"/>
-              <a:gd name="connsiteX6" fmla="*/ 11707367 w 11707367"/>
-              <a:gd name="connsiteY6" fmla="*/ 2572622 h 2572622"/>
-              <a:gd name="connsiteX7" fmla="*/ 0 w 11707367"/>
-              <a:gd name="connsiteY7" fmla="*/ 2572622 h 2572622"/>
-            </a:gdLst>
-            <a:ahLst/>
-            <a:cxnLst>
-              <a:cxn ang="0">
-                <a:pos x="connsiteX0" y="connsiteY0"/>
-              </a:cxn>
-              <a:cxn ang="0">
-                <a:pos x="connsiteX1" y="connsiteY1"/>
-              </a:cxn>
-              <a:cxn ang="0">
-                <a:pos x="connsiteX2" y="connsiteY2"/>
-              </a:cxn>
-              <a:cxn ang="0">
-                <a:pos x="connsiteX3" y="connsiteY3"/>
-              </a:cxn>
-              <a:cxn ang="0">
-                <a:pos x="connsiteX4" y="connsiteY4"/>
-              </a:cxn>
-              <a:cxn ang="0">
-                <a:pos x="connsiteX5" y="connsiteY5"/>
-              </a:cxn>
-              <a:cxn ang="0">
-                <a:pos x="connsiteX6" y="connsiteY6"/>
-              </a:cxn>
-              <a:cxn ang="0">
-                <a:pos x="connsiteX7" y="connsiteY7"/>
-              </a:cxn>
-            </a:cxnLst>
-            <a:rect l="l" t="t" r="r" b="b"/>
-            <a:pathLst>
-              <a:path w="11707367" h="2572622">
-                <a:moveTo>
-                  <a:pt x="0" y="0"/>
-                </a:moveTo>
-                <a:lnTo>
-                  <a:pt x="1888420" y="0"/>
-                </a:lnTo>
-                <a:lnTo>
-                  <a:pt x="2198560" y="310139"/>
-                </a:lnTo>
-                <a:cubicBezTo>
-                  <a:pt x="2261209" y="372788"/>
-                  <a:pt x="2362782" y="372788"/>
-                  <a:pt x="2425431" y="310139"/>
-                </a:cubicBezTo>
-                <a:lnTo>
-                  <a:pt x="2735570" y="0"/>
-                </a:lnTo>
-                <a:lnTo>
-                  <a:pt x="11707367" y="0"/>
-                </a:lnTo>
-                <a:lnTo>
-                  <a:pt x="11707367" y="2572622"/>
-                </a:lnTo>
-                <a:lnTo>
-                  <a:pt x="0" y="2572622"/>
-                </a:lnTo>
-                <a:close/>
-              </a:path>
-            </a:pathLst>
-          </a:custGeom>
-          <a:solidFill>
-            <a:srgbClr val="595959">
-              <a:alpha val="89804"/>
-            </a:srgbClr>
-          </a:solidFill>
-          <a:ln>
-            <a:noFill/>
-          </a:ln>
-        </p:spPr>
-        <p:style>
-          <a:lnRef idx="2">
-            <a:schemeClr val="accent1">
-              <a:shade val="50000"/>
-            </a:schemeClr>
-          </a:lnRef>
-          <a:fillRef idx="1">
-            <a:schemeClr val="accent1"/>
-          </a:fillRef>
-          <a:effectRef idx="0">
-            <a:schemeClr val="accent1"/>
-          </a:effectRef>
-          <a:fontRef idx="minor">
-            <a:schemeClr val="lt1"/>
-          </a:fontRef>
-        </p:style>
-      </p:sp>
       <p:sp>
         <p:nvSpPr>
           <p:cNvPr id="2" name="Title 1">
@@ -12337,6 +11735,63 @@
                 </a:solidFill>
               </a:rPr>
               <a:t>Let the Exploration Begin!</a:t>
+            </a:r>
+          </a:p>
+        </p:txBody>
+      </p:sp>
+      <p:sp>
+        <p:nvSpPr>
+          <p:cNvPr id="11" name="Content Placeholder 2">
+            <a:extLst>
+              <a:ext uri="{FF2B5EF4-FFF2-40B4-BE49-F238E27FC236}">
+                <a16:creationId xmlns:a16="http://schemas.microsoft.com/office/drawing/2014/main" id="{0D1204A5-6A75-48B9-8EA6-5090BE2D06DD}"/>
+              </a:ext>
+            </a:extLst>
+          </p:cNvPr>
+          <p:cNvSpPr>
+            <a:spLocks noGrp="1"/>
+          </p:cNvSpPr>
+          <p:nvPr>
+            <p:ph idx="1"/>
+          </p:nvPr>
+        </p:nvSpPr>
+        <p:spPr>
+          <a:xfrm>
+            <a:off x="6338316" y="4049485"/>
+            <a:ext cx="4846151" cy="1883229"/>
+          </a:xfrm>
+        </p:spPr>
+        <p:txBody>
+          <a:bodyPr>
+            <a:normAutofit/>
+          </a:bodyPr>
+          <a:lstStyle/>
+          <a:p>
+            <a:pPr>
+              <a:buFont typeface="Wingdings" panose="05000000000000000000" pitchFamily="2" charset="2"/>
+              <a:buChar char="Ø"/>
+            </a:pPr>
+            <a:r>
+              <a:rPr lang="en-US">
+                <a:solidFill>
+                  <a:srgbClr val="FFFFFF"/>
+                </a:solidFill>
+              </a:rPr>
+              <a:t>Next, we set out on an adventure to look at our data</a:t>
+            </a:r>
+          </a:p>
+          <a:p>
+            <a:pPr>
+              <a:buFont typeface="Wingdings" panose="05000000000000000000" pitchFamily="2" charset="2"/>
+              <a:buChar char="Ø"/>
+            </a:pPr>
+            <a:r>
+              <a:rPr lang="en-US">
+                <a:solidFill>
+                  <a:srgbClr val="FFFFFF"/>
+                </a:solidFill>
+              </a:rPr>
+              <a:t>We created bar graphs and line charts to look at the patterns</a:t>
             </a:r>
           </a:p>
         </p:txBody>
@@ -12401,63 +11856,6 @@
           </a:prstGeom>
         </p:spPr>
       </p:pic>
-      <p:sp>
-        <p:nvSpPr>
-          <p:cNvPr id="11" name="Content Placeholder 2">
-            <a:extLst>
-              <a:ext uri="{FF2B5EF4-FFF2-40B4-BE49-F238E27FC236}">
-                <a16:creationId xmlns:a16="http://schemas.microsoft.com/office/drawing/2014/main" id="{0D1204A5-6A75-48B9-8EA6-5090BE2D06DD}"/>
-              </a:ext>
-            </a:extLst>
-          </p:cNvPr>
-          <p:cNvSpPr>
-            <a:spLocks noGrp="1"/>
-          </p:cNvSpPr>
-          <p:nvPr>
-            <p:ph idx="1"/>
-          </p:nvPr>
-        </p:nvSpPr>
-        <p:spPr>
-          <a:xfrm>
-            <a:off x="6338316" y="4049485"/>
-            <a:ext cx="4846151" cy="1883229"/>
-          </a:xfrm>
-        </p:spPr>
-        <p:txBody>
-          <a:bodyPr>
-            <a:normAutofit/>
-          </a:bodyPr>
-          <a:lstStyle/>
-          <a:p>
-            <a:pPr>
-              <a:buFont typeface="Wingdings" panose="05000000000000000000" pitchFamily="2" charset="2"/>
-              <a:buChar char="Ø"/>
-            </a:pPr>
-            <a:r>
-              <a:rPr lang="en-US">
-                <a:solidFill>
-                  <a:srgbClr val="FFFFFF"/>
-                </a:solidFill>
-              </a:rPr>
-              <a:t>Next, we set out on an adventure to look at our data</a:t>
-            </a:r>
-          </a:p>
-          <a:p>
-            <a:pPr>
-              <a:buFont typeface="Wingdings" panose="05000000000000000000" pitchFamily="2" charset="2"/>
-              <a:buChar char="Ø"/>
-            </a:pPr>
-            <a:r>
-              <a:rPr lang="en-US">
-                <a:solidFill>
-                  <a:srgbClr val="FFFFFF"/>
-                </a:solidFill>
-              </a:rPr>
-              <a:t>We created bar graphs and line charts to look at the patterns</a:t>
-            </a:r>
-          </a:p>
-        </p:txBody>
-      </p:sp>
       <p:pic>
         <p:nvPicPr>
           <p:cNvPr id="5" name="Picture 4">
@@ -12551,6 +11949,72 @@
           </a:p>
         </p:txBody>
       </p:sp>
+      <p:sp>
+        <p:nvSpPr>
+          <p:cNvPr id="10" name="Content Placeholder 2">
+            <a:extLst>
+              <a:ext uri="{FF2B5EF4-FFF2-40B4-BE49-F238E27FC236}">
+                <a16:creationId xmlns:a16="http://schemas.microsoft.com/office/drawing/2014/main" id="{FDF9180F-8542-47D2-8597-729EFBEBEEF9}"/>
+              </a:ext>
+            </a:extLst>
+          </p:cNvPr>
+          <p:cNvSpPr>
+            <a:spLocks noGrp="1"/>
+          </p:cNvSpPr>
+          <p:nvPr>
+            <p:ph idx="1"/>
+          </p:nvPr>
+        </p:nvSpPr>
+        <p:spPr>
+          <a:xfrm>
+            <a:off x="5477791" y="2307553"/>
+            <a:ext cx="5999505" cy="4036470"/>
+          </a:xfrm>
+        </p:spPr>
+        <p:txBody>
+          <a:bodyPr>
+            <a:normAutofit/>
+          </a:bodyPr>
+          <a:lstStyle/>
+          <a:p>
+            <a:pPr>
+              <a:buFont typeface="Wingdings" panose="05000000000000000000" pitchFamily="2" charset="2"/>
+              <a:buChar char="Ø"/>
+            </a:pPr>
+            <a:r>
+              <a:rPr lang="en-US" sz="2400" dirty="0"/>
+              <a:t>Correlation Coefficient</a:t>
+            </a:r>
+          </a:p>
+          <a:p>
+            <a:pPr>
+              <a:buFont typeface="Wingdings" panose="05000000000000000000" pitchFamily="2" charset="2"/>
+              <a:buChar char="Ø"/>
+            </a:pPr>
+            <a:r>
+              <a:rPr lang="en-US" sz="2400" dirty="0"/>
+              <a:t>R-squared</a:t>
+            </a:r>
+          </a:p>
+          <a:p>
+            <a:pPr>
+              <a:buFont typeface="Wingdings" panose="05000000000000000000" pitchFamily="2" charset="2"/>
+              <a:buChar char="Ø"/>
+            </a:pPr>
+            <a:r>
+              <a:rPr lang="en-US" sz="2400" dirty="0"/>
+              <a:t>P-value</a:t>
+            </a:r>
+          </a:p>
+          <a:p>
+            <a:pPr>
+              <a:buFont typeface="Wingdings" panose="05000000000000000000" pitchFamily="2" charset="2"/>
+              <a:buChar char="Ø"/>
+            </a:pPr>
+            <a:endParaRPr lang="en-US" sz="2400" dirty="0"/>
+          </a:p>
+        </p:txBody>
+      </p:sp>
       <p:pic>
         <p:nvPicPr>
           <p:cNvPr id="5" name="Picture 4">
@@ -12611,72 +12075,6 @@
           </a:prstGeom>
         </p:spPr>
       </p:pic>
-      <p:sp>
-        <p:nvSpPr>
-          <p:cNvPr id="10" name="Content Placeholder 2">
-            <a:extLst>
-              <a:ext uri="{FF2B5EF4-FFF2-40B4-BE49-F238E27FC236}">
-                <a16:creationId xmlns:a16="http://schemas.microsoft.com/office/drawing/2014/main" id="{FDF9180F-8542-47D2-8597-729EFBEBEEF9}"/>
-              </a:ext>
-            </a:extLst>
-          </p:cNvPr>
-          <p:cNvSpPr>
-            <a:spLocks noGrp="1"/>
-          </p:cNvSpPr>
-          <p:nvPr>
-            <p:ph idx="1"/>
-          </p:nvPr>
-        </p:nvSpPr>
-        <p:spPr>
-          <a:xfrm>
-            <a:off x="5477791" y="2307553"/>
-            <a:ext cx="5999505" cy="4036470"/>
-          </a:xfrm>
-        </p:spPr>
-        <p:txBody>
-          <a:bodyPr>
-            <a:normAutofit/>
-          </a:bodyPr>
-          <a:lstStyle/>
-          <a:p>
-            <a:pPr>
-              <a:buFont typeface="Wingdings" panose="05000000000000000000" pitchFamily="2" charset="2"/>
-              <a:buChar char="Ø"/>
-            </a:pPr>
-            <a:r>
-              <a:rPr lang="en-US" sz="2400" dirty="0"/>
-              <a:t>Correlation Coefficient</a:t>
-            </a:r>
-          </a:p>
-          <a:p>
-            <a:pPr>
-              <a:buFont typeface="Wingdings" panose="05000000000000000000" pitchFamily="2" charset="2"/>
-              <a:buChar char="Ø"/>
-            </a:pPr>
-            <a:r>
-              <a:rPr lang="en-US" sz="2400" dirty="0"/>
-              <a:t>R-squared</a:t>
-            </a:r>
-          </a:p>
-          <a:p>
-            <a:pPr>
-              <a:buFont typeface="Wingdings" panose="05000000000000000000" pitchFamily="2" charset="2"/>
-              <a:buChar char="Ø"/>
-            </a:pPr>
-            <a:r>
-              <a:rPr lang="en-US" sz="2400" dirty="0"/>
-              <a:t>P-value</a:t>
-            </a:r>
-          </a:p>
-          <a:p>
-            <a:pPr>
-              <a:buFont typeface="Wingdings" panose="05000000000000000000" pitchFamily="2" charset="2"/>
-              <a:buChar char="Ø"/>
-            </a:pPr>
-            <a:endParaRPr lang="en-US" sz="2400" dirty="0"/>
-          </a:p>
-        </p:txBody>
-      </p:sp>
       <p:sp>
         <p:nvSpPr>
           <p:cNvPr id="9" name="TextBox 8">

</xml_diff>

<commit_message>
add final pwrpoint file
</commit_message>
<xml_diff>
--- a/Presentation/Auto_sales_DH.pptx
+++ b/Presentation/Auto_sales_DH.pptx
@@ -2779,7 +2779,7 @@
           <a:effectLst/>
           <a:extLst>
             <a:ext uri="{91240B29-F687-4f45-9708-019B960494DF}">
-              <a14:hiddenLine xmlns:a14="http://schemas.microsoft.com/office/drawing/2010/main" xmlns="" w="9525">
+              <a14:hiddenLine xmlns="" xmlns:a14="http://schemas.microsoft.com/office/drawing/2010/main" w="9525">
                 <a:solidFill>
                   <a:srgbClr val="000000"/>
                 </a:solidFill>
@@ -2972,7 +2972,7 @@
             <a:fld id="{08B9EBBA-996F-894A-B54A-D6246ED52CEA}" type="datetimeFigureOut">
               <a:rPr lang="en-US" dirty="0"/>
               <a:pPr/>
-              <a:t>8/15/2021</a:t>
+              <a:t>8/15/21</a:t>
             </a:fld>
             <a:endParaRPr lang="en-US" dirty="0"/>
           </a:p>
@@ -3287,7 +3287,7 @@
             <a:fld id="{18C79C5D-2A6F-F04D-97DA-BEF2467B64E4}" type="datetimeFigureOut">
               <a:rPr lang="en-US" dirty="0"/>
               <a:pPr/>
-              <a:t>8/15/2021</a:t>
+              <a:t>8/15/21</a:t>
             </a:fld>
             <a:endParaRPr lang="en-US" dirty="0"/>
           </a:p>
@@ -3772,7 +3772,7 @@
             <a:fld id="{8DFA1846-DA80-1C48-A609-854EA85C59AD}" type="datetimeFigureOut">
               <a:rPr lang="en-US" dirty="0"/>
               <a:pPr/>
-              <a:t>8/15/2021</a:t>
+              <a:t>8/15/21</a:t>
             </a:fld>
             <a:endParaRPr lang="en-US" dirty="0"/>
           </a:p>
@@ -4138,7 +4138,7 @@
             <a:fld id="{FBF54567-0DE4-3F47-BF90-CB84690072F9}" type="datetimeFigureOut">
               <a:rPr lang="en-US" dirty="0"/>
               <a:pPr/>
-              <a:t>8/15/2021</a:t>
+              <a:t>8/15/21</a:t>
             </a:fld>
             <a:endParaRPr lang="en-US" dirty="0"/>
           </a:p>
@@ -4289,7 +4289,7 @@
           <a:ln/>
           <a:extLst>
             <a:ext uri="{91240B29-F687-4f45-9708-019B960494DF}">
-              <a14:hiddenLine xmlns:a14="http://schemas.microsoft.com/office/drawing/2010/main" xmlns="" w="9525">
+              <a14:hiddenLine xmlns="" xmlns:a14="http://schemas.microsoft.com/office/drawing/2010/main" w="9525">
                 <a:solidFill>
                   <a:srgbClr val="000000"/>
                 </a:solidFill>
@@ -4408,7 +4408,7 @@
             <a:fld id="{C6C52C72-DE31-F449-A4ED-4C594FD91407}" type="datetimeFigureOut">
               <a:rPr lang="en-US" dirty="0"/>
               <a:pPr/>
-              <a:t>8/15/2021</a:t>
+              <a:t>8/15/21</a:t>
             </a:fld>
             <a:endParaRPr lang="en-US" dirty="0"/>
           </a:p>
@@ -4561,7 +4561,7 @@
           <a:ln/>
           <a:extLst>
             <a:ext uri="{91240B29-F687-4f45-9708-019B960494DF}">
-              <a14:hiddenLine xmlns:a14="http://schemas.microsoft.com/office/drawing/2010/main" xmlns="" w="9525">
+              <a14:hiddenLine xmlns="" xmlns:a14="http://schemas.microsoft.com/office/drawing/2010/main" w="9525">
                 <a:solidFill>
                   <a:srgbClr val="000000"/>
                 </a:solidFill>
@@ -4690,7 +4690,7 @@
             <a:fld id="{ED62726E-379B-B349-9EED-81ED093FA806}" type="datetimeFigureOut">
               <a:rPr lang="en-US" dirty="0"/>
               <a:pPr/>
-              <a:t>8/15/2021</a:t>
+              <a:t>8/15/21</a:t>
             </a:fld>
             <a:endParaRPr lang="en-US" dirty="0"/>
           </a:p>
@@ -4841,7 +4841,7 @@
           <a:ln/>
           <a:extLst>
             <a:ext uri="{91240B29-F687-4f45-9708-019B960494DF}">
-              <a14:hiddenLine xmlns:a14="http://schemas.microsoft.com/office/drawing/2010/main" xmlns="" w="9525">
+              <a14:hiddenLine xmlns="" xmlns:a14="http://schemas.microsoft.com/office/drawing/2010/main" w="9525">
                 <a:solidFill>
                   <a:srgbClr val="000000"/>
                 </a:solidFill>
@@ -4970,7 +4970,7 @@
             <a:fld id="{9B3A1323-8D79-1946-B0D7-40001CF92E9D}" type="datetimeFigureOut">
               <a:rPr lang="en-US" dirty="0"/>
               <a:pPr/>
-              <a:t>8/15/2021</a:t>
+              <a:t>8/15/21</a:t>
             </a:fld>
             <a:endParaRPr lang="en-US" dirty="0"/>
           </a:p>
@@ -5310,7 +5310,7 @@
             <a:fld id="{8DFA1846-DA80-1C48-A609-854EA85C59AD}" type="datetimeFigureOut">
               <a:rPr lang="en-US" dirty="0"/>
               <a:pPr/>
-              <a:t>8/15/2021</a:t>
+              <a:t>8/15/21</a:t>
             </a:fld>
             <a:endParaRPr lang="en-US" dirty="0"/>
           </a:p>
@@ -5461,7 +5461,7 @@
           <a:ln/>
           <a:extLst>
             <a:ext uri="{91240B29-F687-4f45-9708-019B960494DF}">
-              <a14:hiddenLine xmlns:a14="http://schemas.microsoft.com/office/drawing/2010/main" xmlns="" w="9525">
+              <a14:hiddenLine xmlns="" xmlns:a14="http://schemas.microsoft.com/office/drawing/2010/main" w="9525">
                 <a:solidFill>
                   <a:srgbClr val="000000"/>
                 </a:solidFill>
@@ -5646,7 +5646,7 @@
             <a:fld id="{57302355-E14B-8545-A8F8-0FE83CC9D524}" type="datetimeFigureOut">
               <a:rPr lang="en-US" dirty="0"/>
               <a:pPr/>
-              <a:t>8/15/2021</a:t>
+              <a:t>8/15/21</a:t>
             </a:fld>
             <a:endParaRPr lang="en-US" dirty="0"/>
           </a:p>
@@ -5797,7 +5797,7 @@
           <a:ln/>
           <a:extLst>
             <a:ext uri="{91240B29-F687-4f45-9708-019B960494DF}">
-              <a14:hiddenLine xmlns:a14="http://schemas.microsoft.com/office/drawing/2010/main" xmlns="" w="9525">
+              <a14:hiddenLine xmlns="" xmlns:a14="http://schemas.microsoft.com/office/drawing/2010/main" w="9525">
                 <a:solidFill>
                   <a:srgbClr val="000000"/>
                 </a:solidFill>
@@ -6120,7 +6120,7 @@
             <a:fld id="{02640F58-564D-2B4F-AE67-E407BA4FCF45}" type="datetimeFigureOut">
               <a:rPr lang="en-US" dirty="0"/>
               <a:pPr/>
-              <a:t>8/15/2021</a:t>
+              <a:t>8/15/21</a:t>
             </a:fld>
             <a:endParaRPr lang="en-US" dirty="0"/>
           </a:p>
@@ -6271,7 +6271,7 @@
           <a:ln/>
           <a:extLst>
             <a:ext uri="{91240B29-F687-4f45-9708-019B960494DF}">
-              <a14:hiddenLine xmlns:a14="http://schemas.microsoft.com/office/drawing/2010/main" xmlns="" w="9525">
+              <a14:hiddenLine xmlns="" xmlns:a14="http://schemas.microsoft.com/office/drawing/2010/main" w="9525">
                 <a:solidFill>
                   <a:srgbClr val="000000"/>
                 </a:solidFill>
@@ -6338,7 +6338,7 @@
             <a:fld id="{F13A34C8-038E-2045-AF43-DF7DBB8E0E9E}" type="datetimeFigureOut">
               <a:rPr lang="en-US" dirty="0"/>
               <a:pPr/>
-              <a:t>8/15/2021</a:t>
+              <a:t>8/15/21</a:t>
             </a:fld>
             <a:endParaRPr lang="en-US" dirty="0"/>
           </a:p>
@@ -6430,7 +6430,7 @@
             <a:fld id="{8818C68F-D26B-8F47-958C-23B49CF8A634}" type="datetimeFigureOut">
               <a:rPr lang="en-US" dirty="0"/>
               <a:pPr/>
-              <a:t>8/15/2021</a:t>
+              <a:t>8/15/21</a:t>
             </a:fld>
             <a:endParaRPr lang="en-US" dirty="0"/>
           </a:p>
@@ -6694,7 +6694,7 @@
           <a:ln/>
           <a:extLst>
             <a:ext uri="{91240B29-F687-4f45-9708-019B960494DF}">
-              <a14:hiddenLine xmlns:a14="http://schemas.microsoft.com/office/drawing/2010/main" xmlns="" w="9525">
+              <a14:hiddenLine xmlns="" xmlns:a14="http://schemas.microsoft.com/office/drawing/2010/main" w="9525">
                 <a:solidFill>
                   <a:srgbClr val="000000"/>
                 </a:solidFill>
@@ -6894,7 +6894,7 @@
             <a:fld id="{D0DF5E60-9974-AC48-9591-99C2BB44B7CF}" type="datetimeFigureOut">
               <a:rPr lang="en-US" dirty="0"/>
               <a:pPr/>
-              <a:t>8/15/2021</a:t>
+              <a:t>8/15/21</a:t>
             </a:fld>
             <a:endParaRPr lang="en-US" dirty="0"/>
           </a:p>
@@ -7204,7 +7204,7 @@
             <a:fld id="{18C79C5D-2A6F-F04D-97DA-BEF2467B64E4}" type="datetimeFigureOut">
               <a:rPr lang="en-US" dirty="0"/>
               <a:pPr/>
-              <a:t>8/15/2021</a:t>
+              <a:t>8/15/21</a:t>
             </a:fld>
             <a:endParaRPr lang="en-US" dirty="0"/>
           </a:p>
@@ -7471,7 +7471,7 @@
             <a:fld id="{09B482E8-6E0E-1B4F-B1FD-C69DB9E858D9}" type="datetimeFigureOut">
               <a:rPr lang="en-US" dirty="0"/>
               <a:pPr/>
-              <a:t>8/15/2021</a:t>
+              <a:t>8/15/21</a:t>
             </a:fld>
             <a:endParaRPr lang="en-US" dirty="0"/>
           </a:p>
@@ -8902,9 +8902,7 @@
             <a:r>
               <a:rPr lang="en-US" sz="6000" dirty="0">
                 <a:solidFill>
-                  <a:schemeClr val="accent1">
-                    <a:lumMod val="50000"/>
-                  </a:schemeClr>
+                  <a:schemeClr val="tx1"/>
                 </a:solidFill>
               </a:rPr>
               <a:t>Conclusion</a:t>

</xml_diff>

<commit_message>
updated final with dh change
</commit_message>
<xml_diff>
--- a/Presentation/Auto_sales_DH.pptx
+++ b/Presentation/Auto_sales_DH.pptx
@@ -20,9 +20,8 @@
     <p:sldId id="278" r:id="rId14"/>
     <p:sldId id="279" r:id="rId15"/>
     <p:sldId id="273" r:id="rId16"/>
-    <p:sldId id="262" r:id="rId17"/>
-    <p:sldId id="261" r:id="rId18"/>
-    <p:sldId id="264" r:id="rId19"/>
+    <p:sldId id="281" r:id="rId17"/>
+    <p:sldId id="264" r:id="rId18"/>
   </p:sldIdLst>
   <p:sldSz cx="12192000" cy="6858000"/>
   <p:notesSz cx="6858000" cy="9144000"/>
@@ -2779,7 +2778,7 @@
           <a:effectLst/>
           <a:extLst>
             <a:ext uri="{91240B29-F687-4f45-9708-019B960494DF}">
-              <a14:hiddenLine xmlns="" xmlns:a14="http://schemas.microsoft.com/office/drawing/2010/main" w="9525">
+              <a14:hiddenLine xmlns:a14="http://schemas.microsoft.com/office/drawing/2010/main" xmlns="" w="9525">
                 <a:solidFill>
                   <a:srgbClr val="000000"/>
                 </a:solidFill>
@@ -2972,7 +2971,7 @@
             <a:fld id="{08B9EBBA-996F-894A-B54A-D6246ED52CEA}" type="datetimeFigureOut">
               <a:rPr lang="en-US" dirty="0"/>
               <a:pPr/>
-              <a:t>8/15/21</a:t>
+              <a:t>8/16/2021</a:t>
             </a:fld>
             <a:endParaRPr lang="en-US" dirty="0"/>
           </a:p>
@@ -3287,7 +3286,7 @@
             <a:fld id="{18C79C5D-2A6F-F04D-97DA-BEF2467B64E4}" type="datetimeFigureOut">
               <a:rPr lang="en-US" dirty="0"/>
               <a:pPr/>
-              <a:t>8/15/21</a:t>
+              <a:t>8/16/2021</a:t>
             </a:fld>
             <a:endParaRPr lang="en-US" dirty="0"/>
           </a:p>
@@ -3772,7 +3771,7 @@
             <a:fld id="{8DFA1846-DA80-1C48-A609-854EA85C59AD}" type="datetimeFigureOut">
               <a:rPr lang="en-US" dirty="0"/>
               <a:pPr/>
-              <a:t>8/15/21</a:t>
+              <a:t>8/16/2021</a:t>
             </a:fld>
             <a:endParaRPr lang="en-US" dirty="0"/>
           </a:p>
@@ -4138,7 +4137,7 @@
             <a:fld id="{FBF54567-0DE4-3F47-BF90-CB84690072F9}" type="datetimeFigureOut">
               <a:rPr lang="en-US" dirty="0"/>
               <a:pPr/>
-              <a:t>8/15/21</a:t>
+              <a:t>8/16/2021</a:t>
             </a:fld>
             <a:endParaRPr lang="en-US" dirty="0"/>
           </a:p>
@@ -4289,7 +4288,7 @@
           <a:ln/>
           <a:extLst>
             <a:ext uri="{91240B29-F687-4f45-9708-019B960494DF}">
-              <a14:hiddenLine xmlns="" xmlns:a14="http://schemas.microsoft.com/office/drawing/2010/main" w="9525">
+              <a14:hiddenLine xmlns:a14="http://schemas.microsoft.com/office/drawing/2010/main" xmlns="" w="9525">
                 <a:solidFill>
                   <a:srgbClr val="000000"/>
                 </a:solidFill>
@@ -4408,7 +4407,7 @@
             <a:fld id="{C6C52C72-DE31-F449-A4ED-4C594FD91407}" type="datetimeFigureOut">
               <a:rPr lang="en-US" dirty="0"/>
               <a:pPr/>
-              <a:t>8/15/21</a:t>
+              <a:t>8/16/2021</a:t>
             </a:fld>
             <a:endParaRPr lang="en-US" dirty="0"/>
           </a:p>
@@ -4561,7 +4560,7 @@
           <a:ln/>
           <a:extLst>
             <a:ext uri="{91240B29-F687-4f45-9708-019B960494DF}">
-              <a14:hiddenLine xmlns="" xmlns:a14="http://schemas.microsoft.com/office/drawing/2010/main" w="9525">
+              <a14:hiddenLine xmlns:a14="http://schemas.microsoft.com/office/drawing/2010/main" xmlns="" w="9525">
                 <a:solidFill>
                   <a:srgbClr val="000000"/>
                 </a:solidFill>
@@ -4690,7 +4689,7 @@
             <a:fld id="{ED62726E-379B-B349-9EED-81ED093FA806}" type="datetimeFigureOut">
               <a:rPr lang="en-US" dirty="0"/>
               <a:pPr/>
-              <a:t>8/15/21</a:t>
+              <a:t>8/16/2021</a:t>
             </a:fld>
             <a:endParaRPr lang="en-US" dirty="0"/>
           </a:p>
@@ -4841,7 +4840,7 @@
           <a:ln/>
           <a:extLst>
             <a:ext uri="{91240B29-F687-4f45-9708-019B960494DF}">
-              <a14:hiddenLine xmlns="" xmlns:a14="http://schemas.microsoft.com/office/drawing/2010/main" w="9525">
+              <a14:hiddenLine xmlns:a14="http://schemas.microsoft.com/office/drawing/2010/main" xmlns="" w="9525">
                 <a:solidFill>
                   <a:srgbClr val="000000"/>
                 </a:solidFill>
@@ -4970,7 +4969,7 @@
             <a:fld id="{9B3A1323-8D79-1946-B0D7-40001CF92E9D}" type="datetimeFigureOut">
               <a:rPr lang="en-US" dirty="0"/>
               <a:pPr/>
-              <a:t>8/15/21</a:t>
+              <a:t>8/16/2021</a:t>
             </a:fld>
             <a:endParaRPr lang="en-US" dirty="0"/>
           </a:p>
@@ -5310,7 +5309,7 @@
             <a:fld id="{8DFA1846-DA80-1C48-A609-854EA85C59AD}" type="datetimeFigureOut">
               <a:rPr lang="en-US" dirty="0"/>
               <a:pPr/>
-              <a:t>8/15/21</a:t>
+              <a:t>8/16/2021</a:t>
             </a:fld>
             <a:endParaRPr lang="en-US" dirty="0"/>
           </a:p>
@@ -5461,7 +5460,7 @@
           <a:ln/>
           <a:extLst>
             <a:ext uri="{91240B29-F687-4f45-9708-019B960494DF}">
-              <a14:hiddenLine xmlns="" xmlns:a14="http://schemas.microsoft.com/office/drawing/2010/main" w="9525">
+              <a14:hiddenLine xmlns:a14="http://schemas.microsoft.com/office/drawing/2010/main" xmlns="" w="9525">
                 <a:solidFill>
                   <a:srgbClr val="000000"/>
                 </a:solidFill>
@@ -5646,7 +5645,7 @@
             <a:fld id="{57302355-E14B-8545-A8F8-0FE83CC9D524}" type="datetimeFigureOut">
               <a:rPr lang="en-US" dirty="0"/>
               <a:pPr/>
-              <a:t>8/15/21</a:t>
+              <a:t>8/16/2021</a:t>
             </a:fld>
             <a:endParaRPr lang="en-US" dirty="0"/>
           </a:p>
@@ -5797,7 +5796,7 @@
           <a:ln/>
           <a:extLst>
             <a:ext uri="{91240B29-F687-4f45-9708-019B960494DF}">
-              <a14:hiddenLine xmlns="" xmlns:a14="http://schemas.microsoft.com/office/drawing/2010/main" w="9525">
+              <a14:hiddenLine xmlns:a14="http://schemas.microsoft.com/office/drawing/2010/main" xmlns="" w="9525">
                 <a:solidFill>
                   <a:srgbClr val="000000"/>
                 </a:solidFill>
@@ -6120,7 +6119,7 @@
             <a:fld id="{02640F58-564D-2B4F-AE67-E407BA4FCF45}" type="datetimeFigureOut">
               <a:rPr lang="en-US" dirty="0"/>
               <a:pPr/>
-              <a:t>8/15/21</a:t>
+              <a:t>8/16/2021</a:t>
             </a:fld>
             <a:endParaRPr lang="en-US" dirty="0"/>
           </a:p>
@@ -6271,7 +6270,7 @@
           <a:ln/>
           <a:extLst>
             <a:ext uri="{91240B29-F687-4f45-9708-019B960494DF}">
-              <a14:hiddenLine xmlns="" xmlns:a14="http://schemas.microsoft.com/office/drawing/2010/main" w="9525">
+              <a14:hiddenLine xmlns:a14="http://schemas.microsoft.com/office/drawing/2010/main" xmlns="" w="9525">
                 <a:solidFill>
                   <a:srgbClr val="000000"/>
                 </a:solidFill>
@@ -6338,7 +6337,7 @@
             <a:fld id="{F13A34C8-038E-2045-AF43-DF7DBB8E0E9E}" type="datetimeFigureOut">
               <a:rPr lang="en-US" dirty="0"/>
               <a:pPr/>
-              <a:t>8/15/21</a:t>
+              <a:t>8/16/2021</a:t>
             </a:fld>
             <a:endParaRPr lang="en-US" dirty="0"/>
           </a:p>
@@ -6430,7 +6429,7 @@
             <a:fld id="{8818C68F-D26B-8F47-958C-23B49CF8A634}" type="datetimeFigureOut">
               <a:rPr lang="en-US" dirty="0"/>
               <a:pPr/>
-              <a:t>8/15/21</a:t>
+              <a:t>8/16/2021</a:t>
             </a:fld>
             <a:endParaRPr lang="en-US" dirty="0"/>
           </a:p>
@@ -6694,7 +6693,7 @@
           <a:ln/>
           <a:extLst>
             <a:ext uri="{91240B29-F687-4f45-9708-019B960494DF}">
-              <a14:hiddenLine xmlns="" xmlns:a14="http://schemas.microsoft.com/office/drawing/2010/main" w="9525">
+              <a14:hiddenLine xmlns:a14="http://schemas.microsoft.com/office/drawing/2010/main" xmlns="" w="9525">
                 <a:solidFill>
                   <a:srgbClr val="000000"/>
                 </a:solidFill>
@@ -6894,7 +6893,7 @@
             <a:fld id="{D0DF5E60-9974-AC48-9591-99C2BB44B7CF}" type="datetimeFigureOut">
               <a:rPr lang="en-US" dirty="0"/>
               <a:pPr/>
-              <a:t>8/15/21</a:t>
+              <a:t>8/16/2021</a:t>
             </a:fld>
             <a:endParaRPr lang="en-US" dirty="0"/>
           </a:p>
@@ -7204,7 +7203,7 @@
             <a:fld id="{18C79C5D-2A6F-F04D-97DA-BEF2467B64E4}" type="datetimeFigureOut">
               <a:rPr lang="en-US" dirty="0"/>
               <a:pPr/>
-              <a:t>8/15/21</a:t>
+              <a:t>8/16/2021</a:t>
             </a:fld>
             <a:endParaRPr lang="en-US" dirty="0"/>
           </a:p>
@@ -7471,7 +7470,7 @@
             <a:fld id="{09B482E8-6E0E-1B4F-B1FD-C69DB9E858D9}" type="datetimeFigureOut">
               <a:rPr lang="en-US" dirty="0"/>
               <a:pPr/>
-              <a:t>8/15/21</a:t>
+              <a:t>8/16/2021</a:t>
             </a:fld>
             <a:endParaRPr lang="en-US" dirty="0"/>
           </a:p>
@@ -8848,14 +8847,6 @@
 <file path=ppt/slides/slide16.xml><?xml version="1.0" encoding="utf-8"?>
 <p:sld xmlns:a="http://schemas.openxmlformats.org/drawingml/2006/main" xmlns:r="http://schemas.openxmlformats.org/officeDocument/2006/relationships" xmlns:p="http://schemas.openxmlformats.org/presentationml/2006/main">
   <p:cSld>
-    <p:bg>
-      <p:bgPr>
-        <a:solidFill>
-          <a:schemeClr val="bg2"/>
-        </a:solidFill>
-        <a:effectLst/>
-      </p:bgPr>
-    </p:bg>
     <p:spTree>
       <p:nvGrpSpPr>
         <p:cNvPr id="1" name=""/>
@@ -9041,287 +9032,6 @@
         <p:spPr>
           <a:xfrm>
             <a:off x="223824" y="5439017"/>
-            <a:ext cx="3395479" cy="889494"/>
-          </a:xfrm>
-          <a:prstGeom prst="rect">
-            <a:avLst/>
-          </a:prstGeom>
-          <a:effectLst>
-            <a:outerShdw blurRad="50800" dir="14400000">
-              <a:srgbClr val="000000">
-                <a:alpha val="40000"/>
-              </a:srgbClr>
-            </a:outerShdw>
-          </a:effectLst>
-        </p:spPr>
-        <p:txBody>
-          <a:bodyPr vert="horz" lIns="91440" tIns="45720" rIns="91440" bIns="45720" rtlCol="0" anchor="ctr">
-            <a:normAutofit fontScale="62500" lnSpcReduction="20000"/>
-          </a:bodyPr>
-          <a:lstStyle>
-            <a:lvl1pPr marL="342900" indent="-342900" algn="l" defTabSz="457200" rtl="0" eaLnBrk="1" latinLnBrk="0" hangingPunct="1">
-              <a:spcBef>
-                <a:spcPct val="20000"/>
-              </a:spcBef>
-              <a:spcAft>
-                <a:spcPts val="600"/>
-              </a:spcAft>
-              <a:buClr>
-                <a:schemeClr val="accent1"/>
-              </a:buClr>
-              <a:buFont typeface="Wingdings 2" charset="2"/>
-              <a:buChar char=""/>
-              <a:defRPr sz="1800" kern="1200">
-                <a:solidFill>
-                  <a:schemeClr val="tx1"/>
-                </a:solidFill>
-                <a:latin typeface="+mn-lt"/>
-                <a:ea typeface="+mn-ea"/>
-                <a:cs typeface="+mn-cs"/>
-              </a:defRPr>
-            </a:lvl1pPr>
-            <a:lvl2pPr marL="742950" indent="-285750" algn="l" defTabSz="457200" rtl="0" eaLnBrk="1" latinLnBrk="0" hangingPunct="1">
-              <a:spcBef>
-                <a:spcPct val="20000"/>
-              </a:spcBef>
-              <a:spcAft>
-                <a:spcPts val="600"/>
-              </a:spcAft>
-              <a:buClr>
-                <a:schemeClr val="accent1"/>
-              </a:buClr>
-              <a:buFont typeface="Wingdings 2" charset="2"/>
-              <a:buChar char=""/>
-              <a:defRPr sz="1600" kern="1200">
-                <a:solidFill>
-                  <a:schemeClr val="tx1"/>
-                </a:solidFill>
-                <a:latin typeface="+mn-lt"/>
-                <a:ea typeface="+mn-ea"/>
-                <a:cs typeface="+mn-cs"/>
-              </a:defRPr>
-            </a:lvl2pPr>
-            <a:lvl3pPr marL="1143000" indent="-228600" algn="l" defTabSz="457200" rtl="0" eaLnBrk="1" latinLnBrk="0" hangingPunct="1">
-              <a:spcBef>
-                <a:spcPct val="20000"/>
-              </a:spcBef>
-              <a:spcAft>
-                <a:spcPts val="600"/>
-              </a:spcAft>
-              <a:buClr>
-                <a:schemeClr val="accent1"/>
-              </a:buClr>
-              <a:buFont typeface="Wingdings 2" charset="2"/>
-              <a:buChar char=""/>
-              <a:defRPr sz="1400" kern="1200">
-                <a:solidFill>
-                  <a:schemeClr val="tx1"/>
-                </a:solidFill>
-                <a:latin typeface="+mn-lt"/>
-                <a:ea typeface="+mn-ea"/>
-                <a:cs typeface="+mn-cs"/>
-              </a:defRPr>
-            </a:lvl3pPr>
-            <a:lvl4pPr marL="1600200" indent="-228600" algn="l" defTabSz="457200" rtl="0" eaLnBrk="1" latinLnBrk="0" hangingPunct="1">
-              <a:spcBef>
-                <a:spcPct val="20000"/>
-              </a:spcBef>
-              <a:spcAft>
-                <a:spcPts val="600"/>
-              </a:spcAft>
-              <a:buClr>
-                <a:schemeClr val="accent1"/>
-              </a:buClr>
-              <a:buFont typeface="Wingdings 2" charset="2"/>
-              <a:buChar char=""/>
-              <a:defRPr sz="1200" kern="1200">
-                <a:solidFill>
-                  <a:schemeClr val="tx1"/>
-                </a:solidFill>
-                <a:latin typeface="+mn-lt"/>
-                <a:ea typeface="+mn-ea"/>
-                <a:cs typeface="+mn-cs"/>
-              </a:defRPr>
-            </a:lvl4pPr>
-            <a:lvl5pPr marL="2057400" indent="-228600" algn="l" defTabSz="457200" rtl="0" eaLnBrk="1" latinLnBrk="0" hangingPunct="1">
-              <a:spcBef>
-                <a:spcPct val="20000"/>
-              </a:spcBef>
-              <a:spcAft>
-                <a:spcPts val="600"/>
-              </a:spcAft>
-              <a:buClr>
-                <a:schemeClr val="accent1"/>
-              </a:buClr>
-              <a:buFont typeface="Wingdings 2" charset="2"/>
-              <a:buChar char=""/>
-              <a:defRPr sz="1200" kern="1200">
-                <a:solidFill>
-                  <a:schemeClr val="tx1"/>
-                </a:solidFill>
-                <a:latin typeface="+mn-lt"/>
-                <a:ea typeface="+mn-ea"/>
-                <a:cs typeface="+mn-cs"/>
-              </a:defRPr>
-            </a:lvl5pPr>
-            <a:lvl6pPr marL="2400000" indent="-228600" algn="l" defTabSz="457200" rtl="0" eaLnBrk="1" latinLnBrk="0" hangingPunct="1">
-              <a:spcBef>
-                <a:spcPct val="20000"/>
-              </a:spcBef>
-              <a:spcAft>
-                <a:spcPts val="600"/>
-              </a:spcAft>
-              <a:buClr>
-                <a:schemeClr val="accent1"/>
-              </a:buClr>
-              <a:buFont typeface="Wingdings 2" charset="2"/>
-              <a:buChar char=""/>
-              <a:defRPr sz="1200" kern="1200">
-                <a:solidFill>
-                  <a:schemeClr val="tx1"/>
-                </a:solidFill>
-                <a:latin typeface="+mn-lt"/>
-                <a:ea typeface="+mn-ea"/>
-                <a:cs typeface="+mn-cs"/>
-              </a:defRPr>
-            </a:lvl6pPr>
-            <a:lvl7pPr marL="2800000" indent="-228600" algn="l" defTabSz="457200" rtl="0" eaLnBrk="1" latinLnBrk="0" hangingPunct="1">
-              <a:spcBef>
-                <a:spcPct val="20000"/>
-              </a:spcBef>
-              <a:spcAft>
-                <a:spcPts val="600"/>
-              </a:spcAft>
-              <a:buClr>
-                <a:schemeClr val="accent1"/>
-              </a:buClr>
-              <a:buFont typeface="Wingdings 2" charset="2"/>
-              <a:buChar char=""/>
-              <a:defRPr sz="1200" kern="1200">
-                <a:solidFill>
-                  <a:schemeClr val="tx1"/>
-                </a:solidFill>
-                <a:latin typeface="+mn-lt"/>
-                <a:ea typeface="+mn-ea"/>
-                <a:cs typeface="+mn-cs"/>
-              </a:defRPr>
-            </a:lvl7pPr>
-            <a:lvl8pPr marL="3200000" indent="-228600" algn="l" defTabSz="457200" rtl="0" eaLnBrk="1" latinLnBrk="0" hangingPunct="1">
-              <a:spcBef>
-                <a:spcPct val="20000"/>
-              </a:spcBef>
-              <a:spcAft>
-                <a:spcPts val="600"/>
-              </a:spcAft>
-              <a:buClr>
-                <a:schemeClr val="accent1"/>
-              </a:buClr>
-              <a:buFont typeface="Wingdings 2" charset="2"/>
-              <a:buChar char=""/>
-              <a:defRPr sz="1200" kern="1200">
-                <a:solidFill>
-                  <a:schemeClr val="tx1"/>
-                </a:solidFill>
-                <a:latin typeface="+mn-lt"/>
-                <a:ea typeface="+mn-ea"/>
-                <a:cs typeface="+mn-cs"/>
-              </a:defRPr>
-            </a:lvl8pPr>
-            <a:lvl9pPr marL="3600000" indent="-228600" algn="l" defTabSz="457200" rtl="0" eaLnBrk="1" latinLnBrk="0" hangingPunct="1">
-              <a:spcBef>
-                <a:spcPct val="20000"/>
-              </a:spcBef>
-              <a:spcAft>
-                <a:spcPts val="600"/>
-              </a:spcAft>
-              <a:buClr>
-                <a:schemeClr val="accent1"/>
-              </a:buClr>
-              <a:buFont typeface="Wingdings 2" charset="2"/>
-              <a:buChar char=""/>
-              <a:defRPr sz="1200" kern="1200">
-                <a:solidFill>
-                  <a:schemeClr val="tx1"/>
-                </a:solidFill>
-                <a:latin typeface="+mn-lt"/>
-                <a:ea typeface="+mn-ea"/>
-                <a:cs typeface="+mn-cs"/>
-              </a:defRPr>
-            </a:lvl9pPr>
-          </a:lstStyle>
-          <a:p>
-            <a:pPr marL="0" indent="0">
-              <a:buNone/>
-            </a:pPr>
-            <a:r>
-              <a:rPr lang="en-US" b="1" dirty="0"/>
-              <a:t>   </a:t>
-            </a:r>
-            <a:r>
-              <a:rPr lang="en-US" sz="2400" b="1" u="sng" dirty="0"/>
-              <a:t> </a:t>
-            </a:r>
-            <a:r>
-              <a:rPr lang="en-US" sz="4600" u="sng" dirty="0"/>
-              <a:t>New Questions ? </a:t>
-            </a:r>
-          </a:p>
-          <a:p>
-            <a:pPr marL="0" indent="0">
-              <a:buFont typeface="Wingdings 2" charset="2"/>
-              <a:buNone/>
-            </a:pPr>
-            <a:endParaRPr lang="en-US" dirty="0"/>
-          </a:p>
-        </p:txBody>
-      </p:sp>
-      <p:pic>
-        <p:nvPicPr>
-          <p:cNvPr id="16" name="Picture 15" descr="Diagram, schematic&#10;&#10;Description automatically generated">
-            <a:extLst>
-              <a:ext uri="{FF2B5EF4-FFF2-40B4-BE49-F238E27FC236}">
-                <a16:creationId xmlns:a16="http://schemas.microsoft.com/office/drawing/2014/main" id="{FB44A68F-10B2-41EF-B281-A942DB414923}"/>
-              </a:ext>
-            </a:extLst>
-          </p:cNvPr>
-          <p:cNvPicPr>
-            <a:picLocks noChangeAspect="1"/>
-          </p:cNvPicPr>
-          <p:nvPr/>
-        </p:nvPicPr>
-        <p:blipFill>
-          <a:blip r:embed="rId3"/>
-          <a:stretch>
-            <a:fillRect/>
-          </a:stretch>
-        </p:blipFill>
-        <p:spPr>
-          <a:xfrm>
-            <a:off x="4882931" y="2383612"/>
-            <a:ext cx="6705600" cy="3994595"/>
-          </a:xfrm>
-          <a:prstGeom prst="rect">
-            <a:avLst/>
-          </a:prstGeom>
-        </p:spPr>
-      </p:pic>
-      <p:sp>
-        <p:nvSpPr>
-          <p:cNvPr id="19" name="Content Placeholder 2">
-            <a:extLst>
-              <a:ext uri="{FF2B5EF4-FFF2-40B4-BE49-F238E27FC236}">
-                <a16:creationId xmlns:a16="http://schemas.microsoft.com/office/drawing/2014/main" id="{67F4CCBB-DBF0-445C-BF4C-0076ECA2A1A7}"/>
-              </a:ext>
-            </a:extLst>
-          </p:cNvPr>
-          <p:cNvSpPr txBox="1">
-            <a:spLocks/>
-          </p:cNvSpPr>
-          <p:nvPr/>
-        </p:nvSpPr>
-        <p:spPr>
-          <a:xfrm>
-            <a:off x="210572" y="4700923"/>
             <a:ext cx="3395479" cy="889494"/>
           </a:xfrm>
           <a:prstGeom prst="rect">
@@ -9539,13 +9249,10 @@
               <a:t>   </a:t>
             </a:r>
             <a:r>
-              <a:rPr lang="en-US" sz="2400" b="1" u="sng" dirty="0"/>
-              <a:t> </a:t>
-            </a:r>
-            <a:r>
               <a:rPr lang="en-US" sz="3200" u="sng" dirty="0"/>
-              <a:t>Inferences ? </a:t>
-            </a:r>
+              <a:t>Difficulties?</a:t>
+            </a:r>
+            <a:endParaRPr lang="en-US" sz="5100" u="sng" dirty="0"/>
           </a:p>
           <a:p>
             <a:pPr marL="0" indent="0">
@@ -9556,79 +9263,12 @@
           </a:p>
         </p:txBody>
       </p:sp>
-    </p:spTree>
-    <p:extLst>
-      <p:ext uri="{BB962C8B-B14F-4D97-AF65-F5344CB8AC3E}">
-        <p14:creationId xmlns:p14="http://schemas.microsoft.com/office/powerpoint/2010/main" val="313542103"/>
-      </p:ext>
-    </p:extLst>
-  </p:cSld>
-  <p:clrMapOvr>
-    <a:masterClrMapping/>
-  </p:clrMapOvr>
-</p:sld>
-</file>
-
-<file path=ppt/slides/slide17.xml><?xml version="1.0" encoding="utf-8"?>
-<p:sld xmlns:a="http://schemas.openxmlformats.org/drawingml/2006/main" xmlns:r="http://schemas.openxmlformats.org/officeDocument/2006/relationships" xmlns:p="http://schemas.openxmlformats.org/presentationml/2006/main">
-  <p:cSld>
-    <p:spTree>
-      <p:nvGrpSpPr>
-        <p:cNvPr id="1" name=""/>
-        <p:cNvGrpSpPr/>
-        <p:nvPr/>
-      </p:nvGrpSpPr>
-      <p:grpSpPr>
-        <a:xfrm>
-          <a:off x="0" y="0"/>
-          <a:ext cx="0" cy="0"/>
-          <a:chOff x="0" y="0"/>
-          <a:chExt cx="0" cy="0"/>
-        </a:xfrm>
-      </p:grpSpPr>
-      <p:sp>
-        <p:nvSpPr>
-          <p:cNvPr id="2" name="Title 1">
+      <p:pic>
+        <p:nvPicPr>
+          <p:cNvPr id="16" name="Picture 15" descr="Diagram, schematic&#10;&#10;Description automatically generated">
             <a:extLst>
               <a:ext uri="{FF2B5EF4-FFF2-40B4-BE49-F238E27FC236}">
-                <a16:creationId xmlns:a16="http://schemas.microsoft.com/office/drawing/2014/main" id="{C8183D44-576D-E44F-91A2-906988CBA89E}"/>
-              </a:ext>
-            </a:extLst>
-          </p:cNvPr>
-          <p:cNvSpPr>
-            <a:spLocks noGrp="1"/>
-          </p:cNvSpPr>
-          <p:nvPr>
-            <p:ph type="title"/>
-          </p:nvPr>
-        </p:nvSpPr>
-        <p:spPr>
-          <a:xfrm>
-            <a:off x="654358" y="214009"/>
-            <a:ext cx="10571998" cy="2008278"/>
-          </a:xfrm>
-        </p:spPr>
-        <p:txBody>
-          <a:bodyPr/>
-          <a:lstStyle/>
-          <a:p>
-            <a:r>
-              <a:rPr lang="en-US" sz="5400" dirty="0"/>
-              <a:t>Discussion</a:t>
-            </a:r>
-            <a:br>
-              <a:rPr lang="en-US" sz="6600" dirty="0"/>
-            </a:br>
-            <a:endParaRPr lang="en-US" sz="6600" dirty="0"/>
-          </a:p>
-        </p:txBody>
-      </p:sp>
-      <p:pic>
-        <p:nvPicPr>
-          <p:cNvPr id="4" name="Picture 3">
-            <a:extLst>
-              <a:ext uri="{FF2B5EF4-FFF2-40B4-BE49-F238E27FC236}">
-                <a16:creationId xmlns:a16="http://schemas.microsoft.com/office/drawing/2014/main" id="{9270890A-43F9-144D-A73D-DD6DF03B98EC}"/>
+                <a16:creationId xmlns:a16="http://schemas.microsoft.com/office/drawing/2014/main" id="{FB44A68F-10B2-41EF-B281-A942DB414923}"/>
               </a:ext>
             </a:extLst>
           </p:cNvPr>
@@ -9638,95 +9278,27 @@
           <p:nvPr/>
         </p:nvPicPr>
         <p:blipFill>
-          <a:blip r:embed="rId2">
-            <a:extLst>
-              <a:ext uri="{BEBA8EAE-BF5A-486C-A8C5-ECC9F3942E4B}">
-                <a14:imgProps xmlns:a14="http://schemas.microsoft.com/office/drawing/2010/main">
-                  <a14:imgLayer r:embed="rId3">
-                    <a14:imgEffect>
-                      <a14:backgroundRemoval t="10000" b="90000" l="10000" r="90000">
-                        <a14:foregroundMark x1="14894" y1="70000" x2="14894" y2="70000"/>
-                        <a14:foregroundMark x1="15957" y1="55000" x2="15957" y2="55000"/>
-                        <a14:foregroundMark x1="38298" y1="46250" x2="38298" y2="46250"/>
-                        <a14:foregroundMark x1="74468" y1="47500" x2="74468" y2="47500"/>
-                        <a14:foregroundMark x1="65957" y1="23750" x2="65957" y2="23750"/>
-                        <a14:foregroundMark x1="74468" y1="68750" x2="74468" y2="68750"/>
-                        <a14:backgroundMark x1="15957" y1="78750" x2="15957" y2="78750"/>
-                        <a14:backgroundMark x1="44681" y1="55000" x2="44681" y2="55000"/>
-                        <a14:backgroundMark x1="74468" y1="76250" x2="74468" y2="76250"/>
-                        <a14:backgroundMark x1="12766" y1="57500" x2="12766" y2="57500"/>
-                        <a14:backgroundMark x1="12766" y1="57500" x2="12766" y2="57500"/>
-                        <a14:backgroundMark x1="11702" y1="56250" x2="11702" y2="56250"/>
-                        <a14:backgroundMark x1="12766" y1="57500" x2="12766" y2="57500"/>
-                        <a14:backgroundMark x1="12766" y1="56250" x2="12766" y2="56250"/>
-                        <a14:backgroundMark x1="12766" y1="56250" x2="12766" y2="56250"/>
-                        <a14:backgroundMark x1="13830" y1="56250" x2="13830" y2="56250"/>
-                        <a14:backgroundMark x1="13830" y1="56250" x2="13830" y2="56250"/>
-                        <a14:backgroundMark x1="12766" y1="55000" x2="12766" y2="55000"/>
-                        <a14:backgroundMark x1="12766" y1="55000" x2="12766" y2="55000"/>
-                        <a14:backgroundMark x1="14894" y1="72500" x2="14894" y2="72500"/>
-                        <a14:backgroundMark x1="62766" y1="25000" x2="62766" y2="25000"/>
-                        <a14:backgroundMark x1="62766" y1="25000" x2="62766" y2="25000"/>
-                        <a14:backgroundMark x1="62766" y1="25000" x2="62766" y2="25000"/>
-                        <a14:backgroundMark x1="62766" y1="25000" x2="62766" y2="25000"/>
-                        <a14:backgroundMark x1="72340" y1="72500" x2="72340" y2="72500"/>
-                      </a14:backgroundRemoval>
-                    </a14:imgEffect>
-                  </a14:imgLayer>
-                </a14:imgProps>
-              </a:ext>
-            </a:extLst>
-          </a:blip>
+          <a:blip r:embed="rId3"/>
           <a:stretch>
             <a:fillRect/>
           </a:stretch>
         </p:blipFill>
         <p:spPr>
           <a:xfrm>
-            <a:off x="11373286" y="116489"/>
-            <a:ext cx="736164" cy="626523"/>
+            <a:off x="4882931" y="2383612"/>
+            <a:ext cx="6705600" cy="3994595"/>
           </a:xfrm>
           <a:prstGeom prst="rect">
             <a:avLst/>
           </a:prstGeom>
         </p:spPr>
       </p:pic>
-      <p:pic>
-        <p:nvPicPr>
-          <p:cNvPr id="11" name="Picture 10" descr="A picture containing table, person, indoor, wall&#10;&#10;Description automatically generated">
+      <p:sp>
+        <p:nvSpPr>
+          <p:cNvPr id="19" name="Content Placeholder 2">
             <a:extLst>
               <a:ext uri="{FF2B5EF4-FFF2-40B4-BE49-F238E27FC236}">
-                <a16:creationId xmlns:a16="http://schemas.microsoft.com/office/drawing/2014/main" id="{F5DA3E8B-D142-4D5A-953E-84AF00AF9B9C}"/>
-              </a:ext>
-            </a:extLst>
-          </p:cNvPr>
-          <p:cNvPicPr>
-            <a:picLocks noChangeAspect="1"/>
-          </p:cNvPicPr>
-          <p:nvPr/>
-        </p:nvPicPr>
-        <p:blipFill>
-          <a:blip r:embed="rId4"/>
-          <a:stretch>
-            <a:fillRect/>
-          </a:stretch>
-        </p:blipFill>
-        <p:spPr>
-          <a:xfrm>
-            <a:off x="5334415" y="2386081"/>
-            <a:ext cx="6497071" cy="3904162"/>
-          </a:xfrm>
-          <a:prstGeom prst="rect">
-            <a:avLst/>
-          </a:prstGeom>
-        </p:spPr>
-      </p:pic>
-      <p:sp>
-        <p:nvSpPr>
-          <p:cNvPr id="15" name="Content Placeholder 2">
-            <a:extLst>
-              <a:ext uri="{FF2B5EF4-FFF2-40B4-BE49-F238E27FC236}">
-                <a16:creationId xmlns:a16="http://schemas.microsoft.com/office/drawing/2014/main" id="{FBAC34F7-5B14-4A67-8201-B98B72DCF0E2}"/>
+                <a16:creationId xmlns:a16="http://schemas.microsoft.com/office/drawing/2014/main" id="{67F4CCBB-DBF0-445C-BF4C-0076ECA2A1A7}"/>
               </a:ext>
             </a:extLst>
           </p:cNvPr>
@@ -9737,17 +9309,23 @@
         </p:nvSpPr>
         <p:spPr>
           <a:xfrm>
-            <a:off x="555023" y="3155799"/>
-            <a:ext cx="4779392" cy="2735786"/>
+            <a:off x="210572" y="4700923"/>
+            <a:ext cx="3395479" cy="889494"/>
           </a:xfrm>
           <a:prstGeom prst="rect">
             <a:avLst/>
           </a:prstGeom>
-          <a:effectLst/>
+          <a:effectLst>
+            <a:outerShdw blurRad="50800" dir="14400000">
+              <a:srgbClr val="000000">
+                <a:alpha val="40000"/>
+              </a:srgbClr>
+            </a:outerShdw>
+          </a:effectLst>
         </p:spPr>
         <p:txBody>
           <a:bodyPr vert="horz" lIns="91440" tIns="45720" rIns="91440" bIns="45720" rtlCol="0" anchor="ctr">
-            <a:normAutofit/>
+            <a:normAutofit fontScale="92500"/>
           </a:bodyPr>
           <a:lstStyle>
             <a:lvl1pPr marL="342900" indent="-342900" algn="l" defTabSz="457200" rtl="0" eaLnBrk="1" latinLnBrk="0" hangingPunct="1">
@@ -9942,66 +9520,30 @@
           </a:lstStyle>
           <a:p>
             <a:pPr marL="0" indent="0">
-              <a:buFont typeface="Wingdings 2" charset="2"/>
               <a:buNone/>
             </a:pPr>
             <a:r>
-              <a:rPr lang="en-US" dirty="0"/>
-              <a:t> </a:t>
+              <a:rPr lang="en-US" b="1" dirty="0"/>
+              <a:t>   </a:t>
             </a:r>
             <a:r>
               <a:rPr lang="en-US" sz="3200" u="sng" dirty="0"/>
-              <a:t>Difficulties</a:t>
-            </a:r>
-          </a:p>
-          <a:p>
-            <a:pPr lvl="1"/>
-            <a:r>
-              <a:rPr lang="en-US" dirty="0"/>
-              <a:t> Obtaining Data</a:t>
-            </a:r>
-          </a:p>
-          <a:p>
-            <a:pPr lvl="1"/>
-            <a:r>
-              <a:rPr lang="en-US" dirty="0"/>
-              <a:t>Cleaning/Formatting Data</a:t>
-            </a:r>
-          </a:p>
-          <a:p>
-            <a:pPr lvl="1"/>
-            <a:r>
-              <a:rPr lang="en-US" dirty="0"/>
-              <a:t>GitHub</a:t>
-            </a:r>
-          </a:p>
-          <a:p>
-            <a:pPr lvl="1"/>
-            <a:endParaRPr lang="en-US" dirty="0"/>
-          </a:p>
-          <a:p>
-            <a:pPr lvl="1"/>
-            <a:r>
-              <a:rPr lang="en-US" dirty="0"/>
-              <a:t>COMMUNICATION THE KEY !!!</a:t>
-            </a:r>
-          </a:p>
-          <a:p>
-            <a:pPr marL="457200" lvl="1" indent="0">
+              <a:t>New Questions? </a:t>
+            </a:r>
+          </a:p>
+          <a:p>
+            <a:pPr marL="0" indent="0">
               <a:buFont typeface="Wingdings 2" charset="2"/>
               <a:buNone/>
             </a:pPr>
             <a:endParaRPr lang="en-US" dirty="0"/>
           </a:p>
-          <a:p>
-            <a:endParaRPr lang="en-US" dirty="0"/>
-          </a:p>
         </p:txBody>
       </p:sp>
     </p:spTree>
     <p:extLst>
       <p:ext uri="{BB962C8B-B14F-4D97-AF65-F5344CB8AC3E}">
-        <p14:creationId xmlns:p14="http://schemas.microsoft.com/office/powerpoint/2010/main" val="1728610232"/>
+        <p14:creationId xmlns:p14="http://schemas.microsoft.com/office/powerpoint/2010/main" val="2532293276"/>
       </p:ext>
     </p:extLst>
   </p:cSld>
@@ -10011,7 +9553,7 @@
 </p:sld>
 </file>
 
-<file path=ppt/slides/slide18.xml><?xml version="1.0" encoding="utf-8"?>
+<file path=ppt/slides/slide17.xml><?xml version="1.0" encoding="utf-8"?>
 <p:sld xmlns:a="http://schemas.openxmlformats.org/drawingml/2006/main" xmlns:r="http://schemas.openxmlformats.org/officeDocument/2006/relationships" xmlns:p="http://schemas.openxmlformats.org/presentationml/2006/main">
   <p:cSld>
     <p:spTree>

</xml_diff>